<commit_message>
refactor: update presentation of project
</commit_message>
<xml_diff>
--- a/ИСТ120-РПС-КП-Карабанов/ИСТ-120-РПС-КП-Презентация-Карабанов.pptx
+++ b/ИСТ120-РПС-КП-Карабанов/ИСТ-120-РПС-КП-Презентация-Карабанов.pptx
@@ -5,25 +5,27 @@
     <p:sldMasterId id="2147483672" r:id="rId1"/>
   </p:sldMasterIdLst>
   <p:notesMasterIdLst>
-    <p:notesMasterId r:id="rId18"/>
+    <p:notesMasterId r:id="rId20"/>
   </p:notesMasterIdLst>
   <p:sldIdLst>
     <p:sldId id="256" r:id="rId2"/>
-    <p:sldId id="257" r:id="rId3"/>
-    <p:sldId id="259" r:id="rId4"/>
-    <p:sldId id="258" r:id="rId5"/>
-    <p:sldId id="263" r:id="rId6"/>
-    <p:sldId id="264" r:id="rId7"/>
-    <p:sldId id="268" r:id="rId8"/>
-    <p:sldId id="265" r:id="rId9"/>
-    <p:sldId id="269" r:id="rId10"/>
-    <p:sldId id="266" r:id="rId11"/>
-    <p:sldId id="267" r:id="rId12"/>
-    <p:sldId id="270" r:id="rId13"/>
-    <p:sldId id="271" r:id="rId14"/>
-    <p:sldId id="262" r:id="rId15"/>
-    <p:sldId id="260" r:id="rId16"/>
-    <p:sldId id="261" r:id="rId17"/>
+    <p:sldId id="272" r:id="rId3"/>
+    <p:sldId id="273" r:id="rId4"/>
+    <p:sldId id="257" r:id="rId5"/>
+    <p:sldId id="259" r:id="rId6"/>
+    <p:sldId id="258" r:id="rId7"/>
+    <p:sldId id="263" r:id="rId8"/>
+    <p:sldId id="264" r:id="rId9"/>
+    <p:sldId id="268" r:id="rId10"/>
+    <p:sldId id="265" r:id="rId11"/>
+    <p:sldId id="269" r:id="rId12"/>
+    <p:sldId id="266" r:id="rId13"/>
+    <p:sldId id="267" r:id="rId14"/>
+    <p:sldId id="270" r:id="rId15"/>
+    <p:sldId id="271" r:id="rId16"/>
+    <p:sldId id="262" r:id="rId17"/>
+    <p:sldId id="260" r:id="rId18"/>
+    <p:sldId id="261" r:id="rId19"/>
   </p:sldIdLst>
   <p:sldSz cx="12192000" cy="6858000"/>
   <p:notesSz cx="6858000" cy="9144000"/>
@@ -223,7 +225,7 @@
           <a:p>
             <a:fld id="{4525CC9A-66A6-45FF-8318-771BE5A283CD}" type="datetimeFigureOut">
               <a:rPr lang="ru-RU" smtClean="0"/>
-              <a:t>04.06.2023</a:t>
+              <a:t>05.06.2023</a:t>
             </a:fld>
             <a:endParaRPr lang="ru-RU"/>
           </a:p>
@@ -639,7 +641,7 @@
           <a:p>
             <a:fld id="{EBDA2733-744A-49CA-8CBE-FD573705FE8E}" type="slidenum">
               <a:rPr lang="ru-RU" smtClean="0"/>
-              <a:t>4</a:t>
+              <a:t>6</a:t>
             </a:fld>
             <a:endParaRPr lang="ru-RU"/>
           </a:p>
@@ -723,7 +725,7 @@
           <a:p>
             <a:fld id="{EBDA2733-744A-49CA-8CBE-FD573705FE8E}" type="slidenum">
               <a:rPr lang="ru-RU" smtClean="0"/>
-              <a:t>14</a:t>
+              <a:t>16</a:t>
             </a:fld>
             <a:endParaRPr lang="ru-RU"/>
           </a:p>
@@ -911,7 +913,7 @@
           <a:p>
             <a:fld id="{1C66ABC8-CCA4-4B8F-AB89-07F5D2750DA2}" type="datetime1">
               <a:rPr lang="ru-RU" smtClean="0"/>
-              <a:t>04.06.2023</a:t>
+              <a:t>05.06.2023</a:t>
             </a:fld>
             <a:endParaRPr lang="ru-RU"/>
           </a:p>
@@ -1241,7 +1243,7 @@
           <a:p>
             <a:fld id="{F2E56C0C-0181-4AE0-9192-D81222B2D20A}" type="datetime1">
               <a:rPr lang="ru-RU" smtClean="0"/>
-              <a:t>04.06.2023</a:t>
+              <a:t>05.06.2023</a:t>
             </a:fld>
             <a:endParaRPr lang="ru-RU"/>
           </a:p>
@@ -1421,7 +1423,7 @@
           <a:p>
             <a:fld id="{5FB8542A-98D2-4CE2-990B-09C7C6D79F03}" type="datetime1">
               <a:rPr lang="ru-RU" smtClean="0"/>
-              <a:t>04.06.2023</a:t>
+              <a:t>05.06.2023</a:t>
             </a:fld>
             <a:endParaRPr lang="ru-RU"/>
           </a:p>
@@ -1591,7 +1593,7 @@
           <a:p>
             <a:fld id="{20E9D1A4-D51B-4D2D-BD92-4BF85C0DF7A4}" type="datetime1">
               <a:rPr lang="ru-RU" smtClean="0"/>
-              <a:t>04.06.2023</a:t>
+              <a:t>05.06.2023</a:t>
             </a:fld>
             <a:endParaRPr lang="ru-RU"/>
           </a:p>
@@ -1868,7 +1870,7 @@
           <a:p>
             <a:fld id="{21CC7EFD-6DCF-4647-9ECF-450C7CAC28A9}" type="datetime1">
               <a:rPr lang="ru-RU" smtClean="0"/>
-              <a:t>04.06.2023</a:t>
+              <a:t>05.06.2023</a:t>
             </a:fld>
             <a:endParaRPr lang="ru-RU"/>
           </a:p>
@@ -2262,7 +2264,7 @@
           <a:p>
             <a:fld id="{7214FF07-D32F-481F-8463-2CAF87641EC9}" type="datetime1">
               <a:rPr lang="ru-RU" smtClean="0"/>
-              <a:t>04.06.2023</a:t>
+              <a:t>05.06.2023</a:t>
             </a:fld>
             <a:endParaRPr lang="ru-RU"/>
           </a:p>
@@ -2739,7 +2741,7 @@
           <a:p>
             <a:fld id="{4B35C29C-3F57-4B5F-A42C-CCFF03788800}" type="datetime1">
               <a:rPr lang="ru-RU" smtClean="0"/>
-              <a:t>04.06.2023</a:t>
+              <a:t>05.06.2023</a:t>
             </a:fld>
             <a:endParaRPr lang="ru-RU"/>
           </a:p>
@@ -2857,7 +2859,7 @@
           <a:p>
             <a:fld id="{BA2E38C4-9857-49AF-8273-155DF56839E0}" type="datetime1">
               <a:rPr lang="ru-RU" smtClean="0"/>
-              <a:t>04.06.2023</a:t>
+              <a:t>05.06.2023</a:t>
             </a:fld>
             <a:endParaRPr lang="ru-RU"/>
           </a:p>
@@ -2952,7 +2954,7 @@
           <a:p>
             <a:fld id="{08E693AA-613E-4D90-B5DA-8CE9DCAA60B5}" type="datetime1">
               <a:rPr lang="ru-RU" smtClean="0"/>
-              <a:t>04.06.2023</a:t>
+              <a:t>05.06.2023</a:t>
             </a:fld>
             <a:endParaRPr lang="ru-RU"/>
           </a:p>
@@ -3298,7 +3300,7 @@
           <a:p>
             <a:fld id="{6ECCD433-B5F7-42E0-8F6B-4F9E85F2F6EA}" type="datetime1">
               <a:rPr lang="ru-RU" smtClean="0"/>
-              <a:t>04.06.2023</a:t>
+              <a:t>05.06.2023</a:t>
             </a:fld>
             <a:endParaRPr lang="ru-RU"/>
           </a:p>
@@ -3686,7 +3688,7 @@
           <a:p>
             <a:fld id="{D414164E-9A4F-4FED-95EC-A52A8F7A63E0}" type="datetime1">
               <a:rPr lang="ru-RU" smtClean="0"/>
-              <a:t>04.06.2023</a:t>
+              <a:t>05.06.2023</a:t>
             </a:fld>
             <a:endParaRPr lang="ru-RU"/>
           </a:p>
@@ -3964,7 +3966,7 @@
           <a:p>
             <a:fld id="{B1797F4D-44A0-4C0A-83EF-257632FD2AE3}" type="datetime1">
               <a:rPr lang="ru-RU" smtClean="0"/>
-              <a:t>04.06.2023</a:t>
+              <a:t>05.06.2023</a:t>
             </a:fld>
             <a:endParaRPr lang="ru-RU"/>
           </a:p>
@@ -4625,8 +4627,8 @@
         </p:nvSpPr>
         <p:spPr>
           <a:xfrm>
-            <a:off x="1803400" y="170180"/>
-            <a:ext cx="9601200" cy="916940"/>
+            <a:off x="1352939" y="161679"/>
+            <a:ext cx="10150151" cy="916940"/>
           </a:xfrm>
         </p:spPr>
         <p:txBody>
@@ -4637,15 +4639,89 @@
           <a:p>
             <a:pPr algn="ctr"/>
             <a:r>
-              <a:rPr lang="ru-RU" sz="4000" dirty="0"/>
-              <a:t>Результаты тестирования</a:t>
-            </a:r>
-          </a:p>
-        </p:txBody>
-      </p:sp>
-      <p:sp>
-        <p:nvSpPr>
-          <p:cNvPr id="3" name="Номер слайда 2"/>
+              <a:rPr lang="en-US" sz="4000" dirty="0">
+                <a:latin typeface="Times New Roman" pitchFamily="18" charset="0"/>
+                <a:cs typeface="Times New Roman" pitchFamily="18" charset="0"/>
+              </a:rPr>
+              <a:t>HQL </a:t>
+            </a:r>
+            <a:r>
+              <a:rPr lang="ru-RU" sz="4000" dirty="0">
+                <a:latin typeface="Times New Roman" pitchFamily="18" charset="0"/>
+                <a:cs typeface="Times New Roman" pitchFamily="18" charset="0"/>
+              </a:rPr>
+              <a:t>Запрос для получения медицинской карты по фильтру</a:t>
+            </a:r>
+          </a:p>
+        </p:txBody>
+      </p:sp>
+      <p:pic>
+        <p:nvPicPr>
+          <p:cNvPr id="6146" name="Picture 2"/>
+          <p:cNvPicPr>
+            <a:picLocks noChangeAspect="1" noChangeArrowheads="1"/>
+          </p:cNvPicPr>
+          <p:nvPr/>
+        </p:nvPicPr>
+        <p:blipFill>
+          <a:blip r:embed="rId2">
+            <a:extLst>
+              <a:ext uri="{28A0092B-C50C-407E-A947-70E740481C1C}">
+                <a14:useLocalDpi xmlns:a14="http://schemas.microsoft.com/office/drawing/2010/main" val="0"/>
+              </a:ext>
+            </a:extLst>
+          </a:blip>
+          <a:srcRect/>
+          <a:stretch>
+            <a:fillRect/>
+          </a:stretch>
+        </p:blipFill>
+        <p:spPr bwMode="auto">
+          <a:xfrm>
+            <a:off x="844549" y="2792730"/>
+            <a:ext cx="11303639" cy="1931670"/>
+          </a:xfrm>
+          <a:prstGeom prst="rect">
+            <a:avLst/>
+          </a:prstGeom>
+          <a:noFill/>
+          <a:ln>
+            <a:noFill/>
+          </a:ln>
+          <a:effectLst/>
+          <a:extLst>
+            <a:ext uri="{909E8E84-426E-40DD-AFC4-6F175D3DCCD1}">
+              <a14:hiddenFill xmlns:a14="http://schemas.microsoft.com/office/drawing/2010/main">
+                <a:solidFill>
+                  <a:schemeClr val="accent1"/>
+                </a:solidFill>
+              </a14:hiddenFill>
+            </a:ext>
+            <a:ext uri="{91240B29-F687-4F45-9708-019B960494DF}">
+              <a14:hiddenLine xmlns:a14="http://schemas.microsoft.com/office/drawing/2010/main" w="9525">
+                <a:solidFill>
+                  <a:schemeClr val="tx1"/>
+                </a:solidFill>
+                <a:miter lim="800000"/>
+                <a:headEnd/>
+                <a:tailEnd/>
+              </a14:hiddenLine>
+            </a:ext>
+            <a:ext uri="{AF507438-7753-43E0-B8FC-AC1667EBCBE1}">
+              <a14:hiddenEffects xmlns:a14="http://schemas.microsoft.com/office/drawing/2010/main">
+                <a:effectLst>
+                  <a:outerShdw dist="35921" dir="2700000" algn="ctr" rotWithShape="0">
+                    <a:schemeClr val="bg2"/>
+                  </a:outerShdw>
+                </a:effectLst>
+              </a14:hiddenEffects>
+            </a:ext>
+          </a:extLst>
+        </p:spPr>
+      </p:pic>
+      <p:sp>
+        <p:nvSpPr>
+          <p:cNvPr id="4" name="Номер слайда 3"/>
           <p:cNvSpPr>
             <a:spLocks noGrp="1"/>
           </p:cNvSpPr>
@@ -4661,6 +4737,213 @@
             <a:fld id="{97701FBD-09DE-4BDF-B53C-23B184A2051C}" type="slidenum">
               <a:rPr lang="ru-RU" smtClean="0"/>
               <a:t>10</a:t>
+            </a:fld>
+            <a:endParaRPr lang="ru-RU"/>
+          </a:p>
+        </p:txBody>
+      </p:sp>
+    </p:spTree>
+    <p:extLst>
+      <p:ext uri="{BB962C8B-B14F-4D97-AF65-F5344CB8AC3E}">
+        <p14:creationId xmlns:p14="http://schemas.microsoft.com/office/powerpoint/2010/main" val="619977534"/>
+      </p:ext>
+    </p:extLst>
+  </p:cSld>
+  <p:clrMapOvr>
+    <a:masterClrMapping/>
+  </p:clrMapOvr>
+</p:sld>
+</file>
+
+<file path=ppt/slides/slide11.xml><?xml version="1.0" encoding="utf-8"?>
+<p:sld xmlns:a="http://schemas.openxmlformats.org/drawingml/2006/main" xmlns:r="http://schemas.openxmlformats.org/officeDocument/2006/relationships" xmlns:p="http://schemas.openxmlformats.org/presentationml/2006/main">
+  <p:cSld>
+    <p:spTree>
+      <p:nvGrpSpPr>
+        <p:cNvPr id="1" name=""/>
+        <p:cNvGrpSpPr/>
+        <p:nvPr/>
+      </p:nvGrpSpPr>
+      <p:grpSpPr>
+        <a:xfrm>
+          <a:off x="0" y="0"/>
+          <a:ext cx="0" cy="0"/>
+          <a:chOff x="0" y="0"/>
+          <a:chExt cx="0" cy="0"/>
+        </a:xfrm>
+      </p:grpSpPr>
+      <p:sp>
+        <p:nvSpPr>
+          <p:cNvPr id="2" name="Заголовок 1">
+            <a:extLst>
+              <a:ext uri="{FF2B5EF4-FFF2-40B4-BE49-F238E27FC236}">
+                <a16:creationId xmlns:a16="http://schemas.microsoft.com/office/drawing/2014/main" id="{4FB7650D-4B4D-C29E-5ECF-1801440813B3}"/>
+              </a:ext>
+            </a:extLst>
+          </p:cNvPr>
+          <p:cNvSpPr>
+            <a:spLocks noGrp="1"/>
+          </p:cNvSpPr>
+          <p:nvPr>
+            <p:ph type="title"/>
+          </p:nvPr>
+        </p:nvSpPr>
+        <p:spPr>
+          <a:xfrm>
+            <a:off x="1286070" y="152349"/>
+            <a:ext cx="9919996" cy="916940"/>
+          </a:xfrm>
+        </p:spPr>
+        <p:txBody>
+          <a:bodyPr>
+            <a:noAutofit/>
+          </a:bodyPr>
+          <a:lstStyle/>
+          <a:p>
+            <a:pPr algn="ctr"/>
+            <a:r>
+              <a:rPr lang="ru-RU" sz="4000" dirty="0">
+                <a:latin typeface="Times New Roman" pitchFamily="18" charset="0"/>
+                <a:cs typeface="Times New Roman" pitchFamily="18" charset="0"/>
+              </a:rPr>
+              <a:t>Тест план</a:t>
+            </a:r>
+          </a:p>
+        </p:txBody>
+      </p:sp>
+      <p:pic>
+        <p:nvPicPr>
+          <p:cNvPr id="5" name="Объект 4"/>
+          <p:cNvPicPr>
+            <a:picLocks noGrp="1"/>
+          </p:cNvPicPr>
+          <p:nvPr>
+            <p:ph idx="1"/>
+          </p:nvPr>
+        </p:nvPicPr>
+        <p:blipFill>
+          <a:blip r:embed="rId2"/>
+          <a:stretch>
+            <a:fillRect/>
+          </a:stretch>
+        </p:blipFill>
+        <p:spPr>
+          <a:xfrm>
+            <a:off x="4175760" y="975361"/>
+            <a:ext cx="4226560" cy="5364480"/>
+          </a:xfrm>
+          <a:prstGeom prst="rect">
+            <a:avLst/>
+          </a:prstGeom>
+        </p:spPr>
+      </p:pic>
+      <p:sp>
+        <p:nvSpPr>
+          <p:cNvPr id="4" name="Номер слайда 3"/>
+          <p:cNvSpPr>
+            <a:spLocks noGrp="1"/>
+          </p:cNvSpPr>
+          <p:nvPr>
+            <p:ph type="sldNum" sz="quarter" idx="12"/>
+          </p:nvPr>
+        </p:nvSpPr>
+        <p:spPr/>
+        <p:txBody>
+          <a:bodyPr/>
+          <a:lstStyle/>
+          <a:p>
+            <a:fld id="{97701FBD-09DE-4BDF-B53C-23B184A2051C}" type="slidenum">
+              <a:rPr lang="ru-RU" smtClean="0"/>
+              <a:t>11</a:t>
+            </a:fld>
+            <a:endParaRPr lang="ru-RU"/>
+          </a:p>
+        </p:txBody>
+      </p:sp>
+    </p:spTree>
+    <p:extLst>
+      <p:ext uri="{BB962C8B-B14F-4D97-AF65-F5344CB8AC3E}">
+        <p14:creationId xmlns:p14="http://schemas.microsoft.com/office/powerpoint/2010/main" val="3854768536"/>
+      </p:ext>
+    </p:extLst>
+  </p:cSld>
+  <p:clrMapOvr>
+    <a:masterClrMapping/>
+  </p:clrMapOvr>
+</p:sld>
+</file>
+
+<file path=ppt/slides/slide12.xml><?xml version="1.0" encoding="utf-8"?>
+<p:sld xmlns:a="http://schemas.openxmlformats.org/drawingml/2006/main" xmlns:r="http://schemas.openxmlformats.org/officeDocument/2006/relationships" xmlns:p="http://schemas.openxmlformats.org/presentationml/2006/main">
+  <p:cSld>
+    <p:spTree>
+      <p:nvGrpSpPr>
+        <p:cNvPr id="1" name=""/>
+        <p:cNvGrpSpPr/>
+        <p:nvPr/>
+      </p:nvGrpSpPr>
+      <p:grpSpPr>
+        <a:xfrm>
+          <a:off x="0" y="0"/>
+          <a:ext cx="0" cy="0"/>
+          <a:chOff x="0" y="0"/>
+          <a:chExt cx="0" cy="0"/>
+        </a:xfrm>
+      </p:grpSpPr>
+      <p:sp>
+        <p:nvSpPr>
+          <p:cNvPr id="2" name="Заголовок 1">
+            <a:extLst>
+              <a:ext uri="{FF2B5EF4-FFF2-40B4-BE49-F238E27FC236}">
+                <a16:creationId xmlns:a16="http://schemas.microsoft.com/office/drawing/2014/main" id="{4FB7650D-4B4D-C29E-5ECF-1801440813B3}"/>
+              </a:ext>
+            </a:extLst>
+          </p:cNvPr>
+          <p:cNvSpPr>
+            <a:spLocks noGrp="1"/>
+          </p:cNvSpPr>
+          <p:nvPr>
+            <p:ph type="title"/>
+          </p:nvPr>
+        </p:nvSpPr>
+        <p:spPr>
+          <a:xfrm>
+            <a:off x="1803400" y="170180"/>
+            <a:ext cx="9601200" cy="916940"/>
+          </a:xfrm>
+        </p:spPr>
+        <p:txBody>
+          <a:bodyPr>
+            <a:noAutofit/>
+          </a:bodyPr>
+          <a:lstStyle/>
+          <a:p>
+            <a:pPr algn="ctr"/>
+            <a:r>
+              <a:rPr lang="ru-RU" sz="4000" dirty="0"/>
+              <a:t>Результаты тестирования</a:t>
+            </a:r>
+          </a:p>
+        </p:txBody>
+      </p:sp>
+      <p:sp>
+        <p:nvSpPr>
+          <p:cNvPr id="3" name="Номер слайда 2"/>
+          <p:cNvSpPr>
+            <a:spLocks noGrp="1"/>
+          </p:cNvSpPr>
+          <p:nvPr>
+            <p:ph type="sldNum" sz="quarter" idx="12"/>
+          </p:nvPr>
+        </p:nvSpPr>
+        <p:spPr/>
+        <p:txBody>
+          <a:bodyPr/>
+          <a:lstStyle/>
+          <a:p>
+            <a:fld id="{97701FBD-09DE-4BDF-B53C-23B184A2051C}" type="slidenum">
+              <a:rPr lang="ru-RU" smtClean="0"/>
+              <a:t>12</a:t>
             </a:fld>
             <a:endParaRPr lang="ru-RU"/>
           </a:p>
@@ -4718,265 +5001,6 @@
 </p:sld>
 </file>
 
-<file path=ppt/slides/slide11.xml><?xml version="1.0" encoding="utf-8"?>
-<p:sld xmlns:a="http://schemas.openxmlformats.org/drawingml/2006/main" xmlns:r="http://schemas.openxmlformats.org/officeDocument/2006/relationships" xmlns:p="http://schemas.openxmlformats.org/presentationml/2006/main">
-  <p:cSld>
-    <p:spTree>
-      <p:nvGrpSpPr>
-        <p:cNvPr id="1" name=""/>
-        <p:cNvGrpSpPr/>
-        <p:nvPr/>
-      </p:nvGrpSpPr>
-      <p:grpSpPr>
-        <a:xfrm>
-          <a:off x="0" y="0"/>
-          <a:ext cx="0" cy="0"/>
-          <a:chOff x="0" y="0"/>
-          <a:chExt cx="0" cy="0"/>
-        </a:xfrm>
-      </p:grpSpPr>
-      <p:sp>
-        <p:nvSpPr>
-          <p:cNvPr id="2" name="Заголовок 1">
-            <a:extLst>
-              <a:ext uri="{FF2B5EF4-FFF2-40B4-BE49-F238E27FC236}">
-                <a16:creationId xmlns:a16="http://schemas.microsoft.com/office/drawing/2014/main" id="{4FB7650D-4B4D-C29E-5ECF-1801440813B3}"/>
-              </a:ext>
-            </a:extLst>
-          </p:cNvPr>
-          <p:cNvSpPr>
-            <a:spLocks noGrp="1"/>
-          </p:cNvSpPr>
-          <p:nvPr>
-            <p:ph type="title"/>
-          </p:nvPr>
-        </p:nvSpPr>
-        <p:spPr>
-          <a:xfrm>
-            <a:off x="1295400" y="180340"/>
-            <a:ext cx="9601200" cy="916940"/>
-          </a:xfrm>
-        </p:spPr>
-        <p:txBody>
-          <a:bodyPr>
-            <a:noAutofit/>
-          </a:bodyPr>
-          <a:lstStyle/>
-          <a:p>
-            <a:pPr algn="ctr"/>
-            <a:r>
-              <a:rPr lang="ru-RU" sz="4000" dirty="0">
-                <a:latin typeface="Times New Roman" pitchFamily="18" charset="0"/>
-                <a:cs typeface="Times New Roman" pitchFamily="18" charset="0"/>
-              </a:rPr>
-              <a:t>Время ответа</a:t>
-            </a:r>
-          </a:p>
-        </p:txBody>
-      </p:sp>
-      <p:sp>
-        <p:nvSpPr>
-          <p:cNvPr id="3" name="Номер слайда 2"/>
-          <p:cNvSpPr>
-            <a:spLocks noGrp="1"/>
-          </p:cNvSpPr>
-          <p:nvPr>
-            <p:ph type="sldNum" sz="quarter" idx="12"/>
-          </p:nvPr>
-        </p:nvSpPr>
-        <p:spPr/>
-        <p:txBody>
-          <a:bodyPr/>
-          <a:lstStyle/>
-          <a:p>
-            <a:fld id="{97701FBD-09DE-4BDF-B53C-23B184A2051C}" type="slidenum">
-              <a:rPr lang="ru-RU" smtClean="0"/>
-              <a:t>11</a:t>
-            </a:fld>
-            <a:endParaRPr lang="ru-RU"/>
-          </a:p>
-        </p:txBody>
-      </p:sp>
-      <p:pic>
-        <p:nvPicPr>
-          <p:cNvPr id="6" name="Объект 5" descr="D:\zagryzki\o9NmPHinP_k.jpg"/>
-          <p:cNvPicPr>
-            <a:picLocks noGrp="1"/>
-          </p:cNvPicPr>
-          <p:nvPr>
-            <p:ph idx="1"/>
-          </p:nvPr>
-        </p:nvPicPr>
-        <p:blipFill rotWithShape="1">
-          <a:blip r:embed="rId2" cstate="print">
-            <a:extLst>
-              <a:ext uri="{28A0092B-C50C-407E-A947-70E740481C1C}">
-                <a14:useLocalDpi xmlns:a14="http://schemas.microsoft.com/office/drawing/2010/main" val="0"/>
-              </a:ext>
-            </a:extLst>
-          </a:blip>
-          <a:srcRect l="25433" t="30442"/>
-          <a:stretch/>
-        </p:blipFill>
-        <p:spPr bwMode="auto">
-          <a:xfrm>
-            <a:off x="1563106" y="853244"/>
-            <a:ext cx="9125213" cy="5506916"/>
-          </a:xfrm>
-          <a:prstGeom prst="rect">
-            <a:avLst/>
-          </a:prstGeom>
-          <a:noFill/>
-          <a:ln>
-            <a:noFill/>
-          </a:ln>
-          <a:extLst>
-            <a:ext uri="{53640926-AAD7-44D8-BBD7-CCE9431645EC}">
-              <a14:shadowObscured xmlns:a14="http://schemas.microsoft.com/office/drawing/2010/main"/>
-            </a:ext>
-          </a:extLst>
-        </p:spPr>
-      </p:pic>
-    </p:spTree>
-    <p:extLst>
-      <p:ext uri="{BB962C8B-B14F-4D97-AF65-F5344CB8AC3E}">
-        <p14:creationId xmlns:p14="http://schemas.microsoft.com/office/powerpoint/2010/main" val="230932553"/>
-      </p:ext>
-    </p:extLst>
-  </p:cSld>
-  <p:clrMapOvr>
-    <a:masterClrMapping/>
-  </p:clrMapOvr>
-</p:sld>
-</file>
-
-<file path=ppt/slides/slide12.xml><?xml version="1.0" encoding="utf-8"?>
-<p:sld xmlns:a="http://schemas.openxmlformats.org/drawingml/2006/main" xmlns:r="http://schemas.openxmlformats.org/officeDocument/2006/relationships" xmlns:p="http://schemas.openxmlformats.org/presentationml/2006/main">
-  <p:cSld>
-    <p:spTree>
-      <p:nvGrpSpPr>
-        <p:cNvPr id="1" name=""/>
-        <p:cNvGrpSpPr/>
-        <p:nvPr/>
-      </p:nvGrpSpPr>
-      <p:grpSpPr>
-        <a:xfrm>
-          <a:off x="0" y="0"/>
-          <a:ext cx="0" cy="0"/>
-          <a:chOff x="0" y="0"/>
-          <a:chExt cx="0" cy="0"/>
-        </a:xfrm>
-      </p:grpSpPr>
-      <p:sp>
-        <p:nvSpPr>
-          <p:cNvPr id="2" name="Заголовок 1">
-            <a:extLst>
-              <a:ext uri="{FF2B5EF4-FFF2-40B4-BE49-F238E27FC236}">
-                <a16:creationId xmlns:a16="http://schemas.microsoft.com/office/drawing/2014/main" id="{4FB7650D-4B4D-C29E-5ECF-1801440813B3}"/>
-              </a:ext>
-            </a:extLst>
-          </p:cNvPr>
-          <p:cNvSpPr>
-            <a:spLocks noGrp="1"/>
-          </p:cNvSpPr>
-          <p:nvPr>
-            <p:ph type="title"/>
-          </p:nvPr>
-        </p:nvSpPr>
-        <p:spPr>
-          <a:xfrm>
-            <a:off x="1386840" y="88900"/>
-            <a:ext cx="9601200" cy="916940"/>
-          </a:xfrm>
-        </p:spPr>
-        <p:txBody>
-          <a:bodyPr>
-            <a:noAutofit/>
-          </a:bodyPr>
-          <a:lstStyle/>
-          <a:p>
-            <a:pPr algn="ctr"/>
-            <a:r>
-              <a:rPr lang="ru-RU" sz="4000" dirty="0">
-                <a:latin typeface="Times New Roman" pitchFamily="18" charset="0"/>
-                <a:cs typeface="Times New Roman" pitchFamily="18" charset="0"/>
-              </a:rPr>
-              <a:t>Проблемы, выявленные при тестировании</a:t>
-            </a:r>
-          </a:p>
-        </p:txBody>
-      </p:sp>
-      <p:sp>
-        <p:nvSpPr>
-          <p:cNvPr id="3" name="Номер слайда 2"/>
-          <p:cNvSpPr>
-            <a:spLocks noGrp="1"/>
-          </p:cNvSpPr>
-          <p:nvPr>
-            <p:ph type="sldNum" sz="quarter" idx="12"/>
-          </p:nvPr>
-        </p:nvSpPr>
-        <p:spPr/>
-        <p:txBody>
-          <a:bodyPr/>
-          <a:lstStyle/>
-          <a:p>
-            <a:fld id="{97701FBD-09DE-4BDF-B53C-23B184A2051C}" type="slidenum">
-              <a:rPr lang="ru-RU" smtClean="0"/>
-              <a:t>12</a:t>
-            </a:fld>
-            <a:endParaRPr lang="ru-RU"/>
-          </a:p>
-        </p:txBody>
-      </p:sp>
-      <p:pic>
-        <p:nvPicPr>
-          <p:cNvPr id="6" name="Объект 5" descr="D:\zagryzki\V1AC7Sn4Apw.jpg"/>
-          <p:cNvPicPr>
-            <a:picLocks noGrp="1"/>
-          </p:cNvPicPr>
-          <p:nvPr>
-            <p:ph idx="1"/>
-          </p:nvPr>
-        </p:nvPicPr>
-        <p:blipFill rotWithShape="1">
-          <a:blip r:embed="rId2" cstate="print">
-            <a:extLst>
-              <a:ext uri="{28A0092B-C50C-407E-A947-70E740481C1C}">
-                <a14:useLocalDpi xmlns:a14="http://schemas.microsoft.com/office/drawing/2010/main" val="0"/>
-              </a:ext>
-            </a:extLst>
-          </a:blip>
-          <a:srcRect l="24687" t="32629" r="9294"/>
-          <a:stretch/>
-        </p:blipFill>
-        <p:spPr bwMode="auto">
-          <a:xfrm>
-            <a:off x="1666240" y="1123573"/>
-            <a:ext cx="8859520" cy="5212080"/>
-          </a:xfrm>
-          <a:prstGeom prst="rect">
-            <a:avLst/>
-          </a:prstGeom>
-          <a:noFill/>
-          <a:ln>
-            <a:noFill/>
-          </a:ln>
-        </p:spPr>
-      </p:pic>
-    </p:spTree>
-    <p:extLst>
-      <p:ext uri="{BB962C8B-B14F-4D97-AF65-F5344CB8AC3E}">
-        <p14:creationId xmlns:p14="http://schemas.microsoft.com/office/powerpoint/2010/main" val="196244068"/>
-      </p:ext>
-    </p:extLst>
-  </p:cSld>
-  <p:clrMapOvr>
-    <a:masterClrMapping/>
-  </p:clrMapOvr>
-</p:sld>
-</file>
-
 <file path=ppt/slides/slide13.xml><?xml version="1.0" encoding="utf-8"?>
 <p:sld xmlns:a="http://schemas.openxmlformats.org/drawingml/2006/main" xmlns:r="http://schemas.openxmlformats.org/officeDocument/2006/relationships" xmlns:p="http://schemas.openxmlformats.org/presentationml/2006/main">
   <p:cSld>
@@ -5012,8 +5036,8 @@
         </p:nvSpPr>
         <p:spPr>
           <a:xfrm>
-            <a:off x="1293949" y="99060"/>
-            <a:ext cx="10003971" cy="916940"/>
+            <a:off x="1295400" y="180340"/>
+            <a:ext cx="9601200" cy="916940"/>
           </a:xfrm>
         </p:spPr>
         <p:txBody>
@@ -5028,7 +5052,7 @@
                 <a:latin typeface="Times New Roman" pitchFamily="18" charset="0"/>
                 <a:cs typeface="Times New Roman" pitchFamily="18" charset="0"/>
               </a:rPr>
-              <a:t>Обработка ошибок</a:t>
+              <a:t>Время ответа</a:t>
             </a:r>
           </a:p>
         </p:txBody>
@@ -5058,29 +5082,29 @@
       </p:sp>
       <p:pic>
         <p:nvPicPr>
-          <p:cNvPr id="7171" name="Picture 3"/>
+          <p:cNvPr id="6" name="Объект 5" descr="D:\zagryzki\o9NmPHinP_k.jpg"/>
           <p:cNvPicPr>
-            <a:picLocks noChangeAspect="1" noChangeArrowheads="1"/>
+            <a:picLocks noGrp="1"/>
           </p:cNvPicPr>
-          <p:nvPr/>
+          <p:nvPr>
+            <p:ph idx="1"/>
+          </p:nvPr>
         </p:nvPicPr>
-        <p:blipFill>
-          <a:blip r:embed="rId2">
+        <p:blipFill rotWithShape="1">
+          <a:blip r:embed="rId2" cstate="print">
             <a:extLst>
               <a:ext uri="{28A0092B-C50C-407E-A947-70E740481C1C}">
                 <a14:useLocalDpi xmlns:a14="http://schemas.microsoft.com/office/drawing/2010/main" val="0"/>
               </a:ext>
             </a:extLst>
           </a:blip>
-          <a:srcRect/>
-          <a:stretch>
-            <a:fillRect/>
-          </a:stretch>
+          <a:srcRect l="25433" t="30442"/>
+          <a:stretch/>
         </p:blipFill>
         <p:spPr bwMode="auto">
           <a:xfrm>
-            <a:off x="1300480" y="834708"/>
-            <a:ext cx="9997440" cy="5610060"/>
+            <a:off x="1563106" y="853244"/>
+            <a:ext cx="9125213" cy="5506916"/>
           </a:xfrm>
           <a:prstGeom prst="rect">
             <a:avLst/>
@@ -5089,33 +5113,9 @@
           <a:ln>
             <a:noFill/>
           </a:ln>
-          <a:effectLst/>
           <a:extLst>
-            <a:ext uri="{909E8E84-426E-40DD-AFC4-6F175D3DCCD1}">
-              <a14:hiddenFill xmlns:a14="http://schemas.microsoft.com/office/drawing/2010/main">
-                <a:solidFill>
-                  <a:schemeClr val="accent1"/>
-                </a:solidFill>
-              </a14:hiddenFill>
-            </a:ext>
-            <a:ext uri="{91240B29-F687-4F45-9708-019B960494DF}">
-              <a14:hiddenLine xmlns:a14="http://schemas.microsoft.com/office/drawing/2010/main" w="9525">
-                <a:solidFill>
-                  <a:schemeClr val="tx1"/>
-                </a:solidFill>
-                <a:miter lim="800000"/>
-                <a:headEnd/>
-                <a:tailEnd/>
-              </a14:hiddenLine>
-            </a:ext>
-            <a:ext uri="{AF507438-7753-43E0-B8FC-AC1667EBCBE1}">
-              <a14:hiddenEffects xmlns:a14="http://schemas.microsoft.com/office/drawing/2010/main">
-                <a:effectLst>
-                  <a:outerShdw dist="35921" dir="2700000" algn="ctr" rotWithShape="0">
-                    <a:schemeClr val="bg2"/>
-                  </a:outerShdw>
-                </a:effectLst>
-              </a14:hiddenEffects>
+            <a:ext uri="{53640926-AAD7-44D8-BBD7-CCE9431645EC}">
+              <a14:shadowObscured xmlns:a14="http://schemas.microsoft.com/office/drawing/2010/main"/>
             </a:ext>
           </a:extLst>
         </p:spPr>
@@ -5123,7 +5123,7 @@
     </p:spTree>
     <p:extLst>
       <p:ext uri="{BB962C8B-B14F-4D97-AF65-F5344CB8AC3E}">
-        <p14:creationId xmlns:p14="http://schemas.microsoft.com/office/powerpoint/2010/main" val="3022728071"/>
+        <p14:creationId xmlns:p14="http://schemas.microsoft.com/office/powerpoint/2010/main" val="230932553"/>
       </p:ext>
     </p:extLst>
   </p:cSld>
@@ -5155,7 +5155,7 @@
           <p:cNvPr id="2" name="Заголовок 1">
             <a:extLst>
               <a:ext uri="{FF2B5EF4-FFF2-40B4-BE49-F238E27FC236}">
-                <a16:creationId xmlns:a16="http://schemas.microsoft.com/office/drawing/2014/main" id="{298E6272-2F88-31CE-C51B-FEC2CE5125E3}"/>
+                <a16:creationId xmlns:a16="http://schemas.microsoft.com/office/drawing/2014/main" id="{4FB7650D-4B4D-C29E-5ECF-1801440813B3}"/>
               </a:ext>
             </a:extLst>
           </p:cNvPr>
@@ -5168,8 +5168,8 @@
         </p:nvSpPr>
         <p:spPr>
           <a:xfrm>
-            <a:off x="1285240" y="187960"/>
-            <a:ext cx="9601200" cy="553720"/>
+            <a:off x="1386840" y="88900"/>
+            <a:ext cx="9601200" cy="916940"/>
           </a:xfrm>
         </p:spPr>
         <p:txBody>
@@ -5180,36 +5180,18 @@
           <a:p>
             <a:pPr algn="ctr"/>
             <a:r>
-              <a:rPr lang="ru-RU" sz="4000" dirty="0" err="1">
-                <a:latin typeface="Times New Roman" pitchFamily="18" charset="0"/>
-                <a:cs typeface="Times New Roman" pitchFamily="18" charset="0"/>
-              </a:rPr>
-              <a:t>Кастомная</a:t>
-            </a:r>
-            <a:r>
               <a:rPr lang="ru-RU" sz="4000" dirty="0">
                 <a:latin typeface="Times New Roman" pitchFamily="18" charset="0"/>
                 <a:cs typeface="Times New Roman" pitchFamily="18" charset="0"/>
               </a:rPr>
-              <a:t> </a:t>
-            </a:r>
-            <a:r>
-              <a:rPr lang="ru-RU" sz="4000" dirty="0" err="1">
-                <a:latin typeface="Times New Roman" pitchFamily="18" charset="0"/>
-                <a:cs typeface="Times New Roman" pitchFamily="18" charset="0"/>
-              </a:rPr>
-              <a:t>валидация</a:t>
-            </a:r>
-            <a:endParaRPr lang="ru-RU" sz="4000" dirty="0">
-              <a:latin typeface="Times New Roman" pitchFamily="18" charset="0"/>
-              <a:cs typeface="Times New Roman" pitchFamily="18" charset="0"/>
-            </a:endParaRPr>
-          </a:p>
-        </p:txBody>
-      </p:sp>
-      <p:sp>
-        <p:nvSpPr>
-          <p:cNvPr id="4" name="Номер слайда 3"/>
+              <a:t>Проблемы, выявленные при тестировании</a:t>
+            </a:r>
+          </a:p>
+        </p:txBody>
+      </p:sp>
+      <p:sp>
+        <p:nvSpPr>
+          <p:cNvPr id="3" name="Номер слайда 2"/>
           <p:cNvSpPr>
             <a:spLocks noGrp="1"/>
           </p:cNvSpPr>
@@ -5232,29 +5214,29 @@
       </p:sp>
       <p:pic>
         <p:nvPicPr>
-          <p:cNvPr id="8194" name="Picture 2"/>
+          <p:cNvPr id="6" name="Объект 5" descr="D:\zagryzki\V1AC7Sn4Apw.jpg"/>
           <p:cNvPicPr>
-            <a:picLocks noChangeAspect="1" noChangeArrowheads="1"/>
+            <a:picLocks noGrp="1"/>
           </p:cNvPicPr>
-          <p:nvPr/>
+          <p:nvPr>
+            <p:ph idx="1"/>
+          </p:nvPr>
         </p:nvPicPr>
-        <p:blipFill>
-          <a:blip r:embed="rId3">
+        <p:blipFill rotWithShape="1">
+          <a:blip r:embed="rId2" cstate="print">
             <a:extLst>
               <a:ext uri="{28A0092B-C50C-407E-A947-70E740481C1C}">
                 <a14:useLocalDpi xmlns:a14="http://schemas.microsoft.com/office/drawing/2010/main" val="0"/>
               </a:ext>
             </a:extLst>
           </a:blip>
-          <a:srcRect/>
-          <a:stretch>
-            <a:fillRect/>
-          </a:stretch>
+          <a:srcRect l="24687" t="32629" r="9294"/>
+          <a:stretch/>
         </p:blipFill>
         <p:spPr bwMode="auto">
           <a:xfrm>
-            <a:off x="2930003" y="934720"/>
-            <a:ext cx="8965516" cy="2468880"/>
+            <a:off x="1666240" y="1123573"/>
+            <a:ext cx="8859520" cy="5212080"/>
           </a:xfrm>
           <a:prstGeom prst="rect">
             <a:avLst/>
@@ -5263,169 +5245,12 @@
           <a:ln>
             <a:noFill/>
           </a:ln>
-          <a:effectLst/>
-          <a:extLst>
-            <a:ext uri="{909E8E84-426E-40DD-AFC4-6F175D3DCCD1}">
-              <a14:hiddenFill xmlns:a14="http://schemas.microsoft.com/office/drawing/2010/main">
-                <a:solidFill>
-                  <a:schemeClr val="accent1"/>
-                </a:solidFill>
-              </a14:hiddenFill>
-            </a:ext>
-            <a:ext uri="{91240B29-F687-4F45-9708-019B960494DF}">
-              <a14:hiddenLine xmlns:a14="http://schemas.microsoft.com/office/drawing/2010/main" w="9525">
-                <a:solidFill>
-                  <a:schemeClr val="tx1"/>
-                </a:solidFill>
-                <a:miter lim="800000"/>
-                <a:headEnd/>
-                <a:tailEnd/>
-              </a14:hiddenLine>
-            </a:ext>
-            <a:ext uri="{AF507438-7753-43E0-B8FC-AC1667EBCBE1}">
-              <a14:hiddenEffects xmlns:a14="http://schemas.microsoft.com/office/drawing/2010/main">
-                <a:effectLst>
-                  <a:outerShdw dist="35921" dir="2700000" algn="ctr" rotWithShape="0">
-                    <a:schemeClr val="bg2"/>
-                  </a:outerShdw>
-                </a:effectLst>
-              </a14:hiddenEffects>
-            </a:ext>
-          </a:extLst>
-        </p:spPr>
-      </p:pic>
-      <p:pic>
-        <p:nvPicPr>
-          <p:cNvPr id="8195" name="Picture 3"/>
-          <p:cNvPicPr>
-            <a:picLocks noChangeAspect="1" noChangeArrowheads="1"/>
-          </p:cNvPicPr>
-          <p:nvPr/>
-        </p:nvPicPr>
-        <p:blipFill>
-          <a:blip r:embed="rId4">
-            <a:extLst>
-              <a:ext uri="{28A0092B-C50C-407E-A947-70E740481C1C}">
-                <a14:useLocalDpi xmlns:a14="http://schemas.microsoft.com/office/drawing/2010/main" val="0"/>
-              </a:ext>
-            </a:extLst>
-          </a:blip>
-          <a:srcRect/>
-          <a:stretch>
-            <a:fillRect/>
-          </a:stretch>
-        </p:blipFill>
-        <p:spPr bwMode="auto">
-          <a:xfrm>
-            <a:off x="881379" y="3539966"/>
-            <a:ext cx="5894417" cy="1489234"/>
-          </a:xfrm>
-          <a:prstGeom prst="rect">
-            <a:avLst/>
-          </a:prstGeom>
-          <a:noFill/>
-          <a:ln>
-            <a:noFill/>
-          </a:ln>
-          <a:effectLst/>
-          <a:extLst>
-            <a:ext uri="{909E8E84-426E-40DD-AFC4-6F175D3DCCD1}">
-              <a14:hiddenFill xmlns:a14="http://schemas.microsoft.com/office/drawing/2010/main">
-                <a:solidFill>
-                  <a:schemeClr val="accent1"/>
-                </a:solidFill>
-              </a14:hiddenFill>
-            </a:ext>
-            <a:ext uri="{91240B29-F687-4F45-9708-019B960494DF}">
-              <a14:hiddenLine xmlns:a14="http://schemas.microsoft.com/office/drawing/2010/main" w="9525">
-                <a:solidFill>
-                  <a:schemeClr val="tx1"/>
-                </a:solidFill>
-                <a:miter lim="800000"/>
-                <a:headEnd/>
-                <a:tailEnd/>
-              </a14:hiddenLine>
-            </a:ext>
-            <a:ext uri="{AF507438-7753-43E0-B8FC-AC1667EBCBE1}">
-              <a14:hiddenEffects xmlns:a14="http://schemas.microsoft.com/office/drawing/2010/main">
-                <a:effectLst>
-                  <a:outerShdw dist="35921" dir="2700000" algn="ctr" rotWithShape="0">
-                    <a:schemeClr val="bg2"/>
-                  </a:outerShdw>
-                </a:effectLst>
-              </a14:hiddenEffects>
-            </a:ext>
-          </a:extLst>
-        </p:spPr>
-      </p:pic>
-      <p:pic>
-        <p:nvPicPr>
-          <p:cNvPr id="8196" name="Picture 4"/>
-          <p:cNvPicPr>
-            <a:picLocks noChangeAspect="1" noChangeArrowheads="1"/>
-          </p:cNvPicPr>
-          <p:nvPr/>
-        </p:nvPicPr>
-        <p:blipFill>
-          <a:blip r:embed="rId5">
-            <a:extLst>
-              <a:ext uri="{28A0092B-C50C-407E-A947-70E740481C1C}">
-                <a14:useLocalDpi xmlns:a14="http://schemas.microsoft.com/office/drawing/2010/main" val="0"/>
-              </a:ext>
-            </a:extLst>
-          </a:blip>
-          <a:srcRect/>
-          <a:stretch>
-            <a:fillRect/>
-          </a:stretch>
-        </p:blipFill>
-        <p:spPr bwMode="auto">
-          <a:xfrm>
-            <a:off x="3904432" y="5100320"/>
-            <a:ext cx="7991087" cy="1320800"/>
-          </a:xfrm>
-          <a:prstGeom prst="rect">
-            <a:avLst/>
-          </a:prstGeom>
-          <a:noFill/>
-          <a:ln>
-            <a:noFill/>
-          </a:ln>
-          <a:effectLst/>
-          <a:extLst>
-            <a:ext uri="{909E8E84-426E-40DD-AFC4-6F175D3DCCD1}">
-              <a14:hiddenFill xmlns:a14="http://schemas.microsoft.com/office/drawing/2010/main">
-                <a:solidFill>
-                  <a:schemeClr val="accent1"/>
-                </a:solidFill>
-              </a14:hiddenFill>
-            </a:ext>
-            <a:ext uri="{91240B29-F687-4F45-9708-019B960494DF}">
-              <a14:hiddenLine xmlns:a14="http://schemas.microsoft.com/office/drawing/2010/main" w="9525">
-                <a:solidFill>
-                  <a:schemeClr val="tx1"/>
-                </a:solidFill>
-                <a:miter lim="800000"/>
-                <a:headEnd/>
-                <a:tailEnd/>
-              </a14:hiddenLine>
-            </a:ext>
-            <a:ext uri="{AF507438-7753-43E0-B8FC-AC1667EBCBE1}">
-              <a14:hiddenEffects xmlns:a14="http://schemas.microsoft.com/office/drawing/2010/main">
-                <a:effectLst>
-                  <a:outerShdw dist="35921" dir="2700000" algn="ctr" rotWithShape="0">
-                    <a:schemeClr val="bg2"/>
-                  </a:outerShdw>
-                </a:effectLst>
-              </a14:hiddenEffects>
-            </a:ext>
-          </a:extLst>
         </p:spPr>
       </p:pic>
     </p:spTree>
     <p:extLst>
       <p:ext uri="{BB962C8B-B14F-4D97-AF65-F5344CB8AC3E}">
-        <p14:creationId xmlns:p14="http://schemas.microsoft.com/office/powerpoint/2010/main" val="2005881061"/>
+        <p14:creationId xmlns:p14="http://schemas.microsoft.com/office/powerpoint/2010/main" val="196244068"/>
       </p:ext>
     </p:extLst>
   </p:cSld>
@@ -5457,7 +5282,7 @@
           <p:cNvPr id="2" name="Заголовок 1">
             <a:extLst>
               <a:ext uri="{FF2B5EF4-FFF2-40B4-BE49-F238E27FC236}">
-                <a16:creationId xmlns:a16="http://schemas.microsoft.com/office/drawing/2014/main" id="{741DB593-C3BC-4B43-8E23-BE456D774413}"/>
+                <a16:creationId xmlns:a16="http://schemas.microsoft.com/office/drawing/2014/main" id="{4FB7650D-4B4D-C29E-5ECF-1801440813B3}"/>
               </a:ext>
             </a:extLst>
           </p:cNvPr>
@@ -5470,8 +5295,8 @@
         </p:nvSpPr>
         <p:spPr>
           <a:xfrm>
-            <a:off x="1371600" y="141208"/>
-            <a:ext cx="9601200" cy="569991"/>
+            <a:off x="1293949" y="99060"/>
+            <a:ext cx="10003971" cy="916940"/>
           </a:xfrm>
         </p:spPr>
         <p:txBody>
@@ -5482,8 +5307,11 @@
           <a:p>
             <a:pPr algn="ctr"/>
             <a:r>
-              <a:rPr lang="ru-RU" sz="3200" dirty="0"/>
-              <a:t>Демонстрация работы</a:t>
+              <a:rPr lang="ru-RU" sz="4000" dirty="0">
+                <a:latin typeface="Times New Roman" pitchFamily="18" charset="0"/>
+                <a:cs typeface="Times New Roman" pitchFamily="18" charset="0"/>
+              </a:rPr>
+              <a:t>Обработка ошибок</a:t>
             </a:r>
           </a:p>
         </p:txBody>
@@ -5513,14 +5341,14 @@
       </p:sp>
       <p:pic>
         <p:nvPicPr>
-          <p:cNvPr id="9218" name="Picture 2"/>
+          <p:cNvPr id="7171" name="Picture 3"/>
           <p:cNvPicPr>
             <a:picLocks noChangeAspect="1" noChangeArrowheads="1"/>
           </p:cNvPicPr>
           <p:nvPr/>
         </p:nvPicPr>
         <p:blipFill>
-          <a:blip r:embed="rId2" cstate="print">
+          <a:blip r:embed="rId2">
             <a:extLst>
               <a:ext uri="{28A0092B-C50C-407E-A947-70E740481C1C}">
                 <a14:useLocalDpi xmlns:a14="http://schemas.microsoft.com/office/drawing/2010/main" val="0"/>
@@ -5534,8 +5362,8 @@
         </p:blipFill>
         <p:spPr bwMode="auto">
           <a:xfrm>
-            <a:off x="766762" y="2089605"/>
-            <a:ext cx="5619595" cy="3084893"/>
+            <a:off x="1300480" y="834708"/>
+            <a:ext cx="9997440" cy="5610060"/>
           </a:xfrm>
           <a:prstGeom prst="rect">
             <a:avLst/>
@@ -5575,138 +5403,10 @@
           </a:extLst>
         </p:spPr>
       </p:pic>
-      <p:pic>
-        <p:nvPicPr>
-          <p:cNvPr id="9219" name="Picture 3"/>
-          <p:cNvPicPr>
-            <a:picLocks noChangeAspect="1" noChangeArrowheads="1"/>
-          </p:cNvPicPr>
-          <p:nvPr/>
-        </p:nvPicPr>
-        <p:blipFill>
-          <a:blip r:embed="rId3" cstate="print">
-            <a:extLst>
-              <a:ext uri="{28A0092B-C50C-407E-A947-70E740481C1C}">
-                <a14:useLocalDpi xmlns:a14="http://schemas.microsoft.com/office/drawing/2010/main" val="0"/>
-              </a:ext>
-            </a:extLst>
-          </a:blip>
-          <a:srcRect/>
-          <a:stretch>
-            <a:fillRect/>
-          </a:stretch>
-        </p:blipFill>
-        <p:spPr bwMode="auto">
-          <a:xfrm>
-            <a:off x="5592763" y="634365"/>
-            <a:ext cx="6355397" cy="2991761"/>
-          </a:xfrm>
-          <a:prstGeom prst="rect">
-            <a:avLst/>
-          </a:prstGeom>
-          <a:noFill/>
-          <a:ln>
-            <a:noFill/>
-          </a:ln>
-          <a:effectLst/>
-          <a:extLst>
-            <a:ext uri="{909E8E84-426E-40DD-AFC4-6F175D3DCCD1}">
-              <a14:hiddenFill xmlns:a14="http://schemas.microsoft.com/office/drawing/2010/main">
-                <a:solidFill>
-                  <a:schemeClr val="accent1"/>
-                </a:solidFill>
-              </a14:hiddenFill>
-            </a:ext>
-            <a:ext uri="{91240B29-F687-4F45-9708-019B960494DF}">
-              <a14:hiddenLine xmlns:a14="http://schemas.microsoft.com/office/drawing/2010/main" w="9525">
-                <a:solidFill>
-                  <a:schemeClr val="tx1"/>
-                </a:solidFill>
-                <a:miter lim="800000"/>
-                <a:headEnd/>
-                <a:tailEnd/>
-              </a14:hiddenLine>
-            </a:ext>
-            <a:ext uri="{AF507438-7753-43E0-B8FC-AC1667EBCBE1}">
-              <a14:hiddenEffects xmlns:a14="http://schemas.microsoft.com/office/drawing/2010/main">
-                <a:effectLst>
-                  <a:outerShdw dist="35921" dir="2700000" algn="ctr" rotWithShape="0">
-                    <a:schemeClr val="bg2"/>
-                  </a:outerShdw>
-                </a:effectLst>
-              </a14:hiddenEffects>
-            </a:ext>
-          </a:extLst>
-        </p:spPr>
-      </p:pic>
-      <p:pic>
-        <p:nvPicPr>
-          <p:cNvPr id="9220" name="Picture 4"/>
-          <p:cNvPicPr>
-            <a:picLocks noChangeAspect="1" noChangeArrowheads="1"/>
-          </p:cNvPicPr>
-          <p:nvPr/>
-        </p:nvPicPr>
-        <p:blipFill>
-          <a:blip r:embed="rId4" cstate="print">
-            <a:extLst>
-              <a:ext uri="{28A0092B-C50C-407E-A947-70E740481C1C}">
-                <a14:useLocalDpi xmlns:a14="http://schemas.microsoft.com/office/drawing/2010/main" val="0"/>
-              </a:ext>
-            </a:extLst>
-          </a:blip>
-          <a:srcRect/>
-          <a:stretch>
-            <a:fillRect/>
-          </a:stretch>
-        </p:blipFill>
-        <p:spPr bwMode="auto">
-          <a:xfrm>
-            <a:off x="5624796" y="3779520"/>
-            <a:ext cx="6323364" cy="2926080"/>
-          </a:xfrm>
-          <a:prstGeom prst="rect">
-            <a:avLst/>
-          </a:prstGeom>
-          <a:noFill/>
-          <a:ln>
-            <a:noFill/>
-          </a:ln>
-          <a:effectLst/>
-          <a:extLst>
-            <a:ext uri="{909E8E84-426E-40DD-AFC4-6F175D3DCCD1}">
-              <a14:hiddenFill xmlns:a14="http://schemas.microsoft.com/office/drawing/2010/main">
-                <a:solidFill>
-                  <a:schemeClr val="accent1"/>
-                </a:solidFill>
-              </a14:hiddenFill>
-            </a:ext>
-            <a:ext uri="{91240B29-F687-4F45-9708-019B960494DF}">
-              <a14:hiddenLine xmlns:a14="http://schemas.microsoft.com/office/drawing/2010/main" w="9525">
-                <a:solidFill>
-                  <a:schemeClr val="tx1"/>
-                </a:solidFill>
-                <a:miter lim="800000"/>
-                <a:headEnd/>
-                <a:tailEnd/>
-              </a14:hiddenLine>
-            </a:ext>
-            <a:ext uri="{AF507438-7753-43E0-B8FC-AC1667EBCBE1}">
-              <a14:hiddenEffects xmlns:a14="http://schemas.microsoft.com/office/drawing/2010/main">
-                <a:effectLst>
-                  <a:outerShdw dist="35921" dir="2700000" algn="ctr" rotWithShape="0">
-                    <a:schemeClr val="bg2"/>
-                  </a:outerShdw>
-                </a:effectLst>
-              </a14:hiddenEffects>
-            </a:ext>
-          </a:extLst>
-        </p:spPr>
-      </p:pic>
     </p:spTree>
     <p:extLst>
       <p:ext uri="{BB962C8B-B14F-4D97-AF65-F5344CB8AC3E}">
-        <p14:creationId xmlns:p14="http://schemas.microsoft.com/office/powerpoint/2010/main" val="2544387504"/>
+        <p14:creationId xmlns:p14="http://schemas.microsoft.com/office/powerpoint/2010/main" val="3022728071"/>
       </p:ext>
     </p:extLst>
   </p:cSld>
@@ -5738,6 +5438,589 @@
           <p:cNvPr id="2" name="Заголовок 1">
             <a:extLst>
               <a:ext uri="{FF2B5EF4-FFF2-40B4-BE49-F238E27FC236}">
+                <a16:creationId xmlns:a16="http://schemas.microsoft.com/office/drawing/2014/main" id="{298E6272-2F88-31CE-C51B-FEC2CE5125E3}"/>
+              </a:ext>
+            </a:extLst>
+          </p:cNvPr>
+          <p:cNvSpPr>
+            <a:spLocks noGrp="1"/>
+          </p:cNvSpPr>
+          <p:nvPr>
+            <p:ph type="title"/>
+          </p:nvPr>
+        </p:nvSpPr>
+        <p:spPr>
+          <a:xfrm>
+            <a:off x="1285240" y="187960"/>
+            <a:ext cx="9601200" cy="553720"/>
+          </a:xfrm>
+        </p:spPr>
+        <p:txBody>
+          <a:bodyPr>
+            <a:noAutofit/>
+          </a:bodyPr>
+          <a:lstStyle/>
+          <a:p>
+            <a:pPr algn="ctr"/>
+            <a:r>
+              <a:rPr lang="ru-RU" sz="4000" dirty="0" err="1">
+                <a:latin typeface="Times New Roman" pitchFamily="18" charset="0"/>
+                <a:cs typeface="Times New Roman" pitchFamily="18" charset="0"/>
+              </a:rPr>
+              <a:t>Кастомная</a:t>
+            </a:r>
+            <a:r>
+              <a:rPr lang="ru-RU" sz="4000" dirty="0">
+                <a:latin typeface="Times New Roman" pitchFamily="18" charset="0"/>
+                <a:cs typeface="Times New Roman" pitchFamily="18" charset="0"/>
+              </a:rPr>
+              <a:t> </a:t>
+            </a:r>
+            <a:r>
+              <a:rPr lang="ru-RU" sz="4000" dirty="0" err="1">
+                <a:latin typeface="Times New Roman" pitchFamily="18" charset="0"/>
+                <a:cs typeface="Times New Roman" pitchFamily="18" charset="0"/>
+              </a:rPr>
+              <a:t>валидация</a:t>
+            </a:r>
+            <a:endParaRPr lang="ru-RU" sz="4000" dirty="0">
+              <a:latin typeface="Times New Roman" pitchFamily="18" charset="0"/>
+              <a:cs typeface="Times New Roman" pitchFamily="18" charset="0"/>
+            </a:endParaRPr>
+          </a:p>
+        </p:txBody>
+      </p:sp>
+      <p:sp>
+        <p:nvSpPr>
+          <p:cNvPr id="4" name="Номер слайда 3"/>
+          <p:cNvSpPr>
+            <a:spLocks noGrp="1"/>
+          </p:cNvSpPr>
+          <p:nvPr>
+            <p:ph type="sldNum" sz="quarter" idx="12"/>
+          </p:nvPr>
+        </p:nvSpPr>
+        <p:spPr/>
+        <p:txBody>
+          <a:bodyPr/>
+          <a:lstStyle/>
+          <a:p>
+            <a:fld id="{97701FBD-09DE-4BDF-B53C-23B184A2051C}" type="slidenum">
+              <a:rPr lang="ru-RU" smtClean="0"/>
+              <a:t>16</a:t>
+            </a:fld>
+            <a:endParaRPr lang="ru-RU"/>
+          </a:p>
+        </p:txBody>
+      </p:sp>
+      <p:pic>
+        <p:nvPicPr>
+          <p:cNvPr id="8194" name="Picture 2"/>
+          <p:cNvPicPr>
+            <a:picLocks noChangeAspect="1" noChangeArrowheads="1"/>
+          </p:cNvPicPr>
+          <p:nvPr/>
+        </p:nvPicPr>
+        <p:blipFill>
+          <a:blip r:embed="rId3">
+            <a:extLst>
+              <a:ext uri="{28A0092B-C50C-407E-A947-70E740481C1C}">
+                <a14:useLocalDpi xmlns:a14="http://schemas.microsoft.com/office/drawing/2010/main" val="0"/>
+              </a:ext>
+            </a:extLst>
+          </a:blip>
+          <a:srcRect/>
+          <a:stretch>
+            <a:fillRect/>
+          </a:stretch>
+        </p:blipFill>
+        <p:spPr bwMode="auto">
+          <a:xfrm>
+            <a:off x="2930003" y="934720"/>
+            <a:ext cx="8965516" cy="2468880"/>
+          </a:xfrm>
+          <a:prstGeom prst="rect">
+            <a:avLst/>
+          </a:prstGeom>
+          <a:noFill/>
+          <a:ln>
+            <a:noFill/>
+          </a:ln>
+          <a:effectLst/>
+          <a:extLst>
+            <a:ext uri="{909E8E84-426E-40DD-AFC4-6F175D3DCCD1}">
+              <a14:hiddenFill xmlns:a14="http://schemas.microsoft.com/office/drawing/2010/main">
+                <a:solidFill>
+                  <a:schemeClr val="accent1"/>
+                </a:solidFill>
+              </a14:hiddenFill>
+            </a:ext>
+            <a:ext uri="{91240B29-F687-4F45-9708-019B960494DF}">
+              <a14:hiddenLine xmlns:a14="http://schemas.microsoft.com/office/drawing/2010/main" w="9525">
+                <a:solidFill>
+                  <a:schemeClr val="tx1"/>
+                </a:solidFill>
+                <a:miter lim="800000"/>
+                <a:headEnd/>
+                <a:tailEnd/>
+              </a14:hiddenLine>
+            </a:ext>
+            <a:ext uri="{AF507438-7753-43E0-B8FC-AC1667EBCBE1}">
+              <a14:hiddenEffects xmlns:a14="http://schemas.microsoft.com/office/drawing/2010/main">
+                <a:effectLst>
+                  <a:outerShdw dist="35921" dir="2700000" algn="ctr" rotWithShape="0">
+                    <a:schemeClr val="bg2"/>
+                  </a:outerShdw>
+                </a:effectLst>
+              </a14:hiddenEffects>
+            </a:ext>
+          </a:extLst>
+        </p:spPr>
+      </p:pic>
+      <p:pic>
+        <p:nvPicPr>
+          <p:cNvPr id="8195" name="Picture 3"/>
+          <p:cNvPicPr>
+            <a:picLocks noChangeAspect="1" noChangeArrowheads="1"/>
+          </p:cNvPicPr>
+          <p:nvPr/>
+        </p:nvPicPr>
+        <p:blipFill>
+          <a:blip r:embed="rId4">
+            <a:extLst>
+              <a:ext uri="{28A0092B-C50C-407E-A947-70E740481C1C}">
+                <a14:useLocalDpi xmlns:a14="http://schemas.microsoft.com/office/drawing/2010/main" val="0"/>
+              </a:ext>
+            </a:extLst>
+          </a:blip>
+          <a:srcRect/>
+          <a:stretch>
+            <a:fillRect/>
+          </a:stretch>
+        </p:blipFill>
+        <p:spPr bwMode="auto">
+          <a:xfrm>
+            <a:off x="881379" y="3539966"/>
+            <a:ext cx="5894417" cy="1489234"/>
+          </a:xfrm>
+          <a:prstGeom prst="rect">
+            <a:avLst/>
+          </a:prstGeom>
+          <a:noFill/>
+          <a:ln>
+            <a:noFill/>
+          </a:ln>
+          <a:effectLst/>
+          <a:extLst>
+            <a:ext uri="{909E8E84-426E-40DD-AFC4-6F175D3DCCD1}">
+              <a14:hiddenFill xmlns:a14="http://schemas.microsoft.com/office/drawing/2010/main">
+                <a:solidFill>
+                  <a:schemeClr val="accent1"/>
+                </a:solidFill>
+              </a14:hiddenFill>
+            </a:ext>
+            <a:ext uri="{91240B29-F687-4F45-9708-019B960494DF}">
+              <a14:hiddenLine xmlns:a14="http://schemas.microsoft.com/office/drawing/2010/main" w="9525">
+                <a:solidFill>
+                  <a:schemeClr val="tx1"/>
+                </a:solidFill>
+                <a:miter lim="800000"/>
+                <a:headEnd/>
+                <a:tailEnd/>
+              </a14:hiddenLine>
+            </a:ext>
+            <a:ext uri="{AF507438-7753-43E0-B8FC-AC1667EBCBE1}">
+              <a14:hiddenEffects xmlns:a14="http://schemas.microsoft.com/office/drawing/2010/main">
+                <a:effectLst>
+                  <a:outerShdw dist="35921" dir="2700000" algn="ctr" rotWithShape="0">
+                    <a:schemeClr val="bg2"/>
+                  </a:outerShdw>
+                </a:effectLst>
+              </a14:hiddenEffects>
+            </a:ext>
+          </a:extLst>
+        </p:spPr>
+      </p:pic>
+      <p:pic>
+        <p:nvPicPr>
+          <p:cNvPr id="8196" name="Picture 4"/>
+          <p:cNvPicPr>
+            <a:picLocks noChangeAspect="1" noChangeArrowheads="1"/>
+          </p:cNvPicPr>
+          <p:nvPr/>
+        </p:nvPicPr>
+        <p:blipFill>
+          <a:blip r:embed="rId5">
+            <a:extLst>
+              <a:ext uri="{28A0092B-C50C-407E-A947-70E740481C1C}">
+                <a14:useLocalDpi xmlns:a14="http://schemas.microsoft.com/office/drawing/2010/main" val="0"/>
+              </a:ext>
+            </a:extLst>
+          </a:blip>
+          <a:srcRect/>
+          <a:stretch>
+            <a:fillRect/>
+          </a:stretch>
+        </p:blipFill>
+        <p:spPr bwMode="auto">
+          <a:xfrm>
+            <a:off x="3904432" y="5100320"/>
+            <a:ext cx="7991087" cy="1320800"/>
+          </a:xfrm>
+          <a:prstGeom prst="rect">
+            <a:avLst/>
+          </a:prstGeom>
+          <a:noFill/>
+          <a:ln>
+            <a:noFill/>
+          </a:ln>
+          <a:effectLst/>
+          <a:extLst>
+            <a:ext uri="{909E8E84-426E-40DD-AFC4-6F175D3DCCD1}">
+              <a14:hiddenFill xmlns:a14="http://schemas.microsoft.com/office/drawing/2010/main">
+                <a:solidFill>
+                  <a:schemeClr val="accent1"/>
+                </a:solidFill>
+              </a14:hiddenFill>
+            </a:ext>
+            <a:ext uri="{91240B29-F687-4F45-9708-019B960494DF}">
+              <a14:hiddenLine xmlns:a14="http://schemas.microsoft.com/office/drawing/2010/main" w="9525">
+                <a:solidFill>
+                  <a:schemeClr val="tx1"/>
+                </a:solidFill>
+                <a:miter lim="800000"/>
+                <a:headEnd/>
+                <a:tailEnd/>
+              </a14:hiddenLine>
+            </a:ext>
+            <a:ext uri="{AF507438-7753-43E0-B8FC-AC1667EBCBE1}">
+              <a14:hiddenEffects xmlns:a14="http://schemas.microsoft.com/office/drawing/2010/main">
+                <a:effectLst>
+                  <a:outerShdw dist="35921" dir="2700000" algn="ctr" rotWithShape="0">
+                    <a:schemeClr val="bg2"/>
+                  </a:outerShdw>
+                </a:effectLst>
+              </a14:hiddenEffects>
+            </a:ext>
+          </a:extLst>
+        </p:spPr>
+      </p:pic>
+    </p:spTree>
+    <p:extLst>
+      <p:ext uri="{BB962C8B-B14F-4D97-AF65-F5344CB8AC3E}">
+        <p14:creationId xmlns:p14="http://schemas.microsoft.com/office/powerpoint/2010/main" val="2005881061"/>
+      </p:ext>
+    </p:extLst>
+  </p:cSld>
+  <p:clrMapOvr>
+    <a:masterClrMapping/>
+  </p:clrMapOvr>
+</p:sld>
+</file>
+
+<file path=ppt/slides/slide17.xml><?xml version="1.0" encoding="utf-8"?>
+<p:sld xmlns:a="http://schemas.openxmlformats.org/drawingml/2006/main" xmlns:r="http://schemas.openxmlformats.org/officeDocument/2006/relationships" xmlns:p="http://schemas.openxmlformats.org/presentationml/2006/main">
+  <p:cSld>
+    <p:spTree>
+      <p:nvGrpSpPr>
+        <p:cNvPr id="1" name=""/>
+        <p:cNvGrpSpPr/>
+        <p:nvPr/>
+      </p:nvGrpSpPr>
+      <p:grpSpPr>
+        <a:xfrm>
+          <a:off x="0" y="0"/>
+          <a:ext cx="0" cy="0"/>
+          <a:chOff x="0" y="0"/>
+          <a:chExt cx="0" cy="0"/>
+        </a:xfrm>
+      </p:grpSpPr>
+      <p:sp>
+        <p:nvSpPr>
+          <p:cNvPr id="2" name="Заголовок 1">
+            <a:extLst>
+              <a:ext uri="{FF2B5EF4-FFF2-40B4-BE49-F238E27FC236}">
+                <a16:creationId xmlns:a16="http://schemas.microsoft.com/office/drawing/2014/main" id="{741DB593-C3BC-4B43-8E23-BE456D774413}"/>
+              </a:ext>
+            </a:extLst>
+          </p:cNvPr>
+          <p:cNvSpPr>
+            <a:spLocks noGrp="1"/>
+          </p:cNvSpPr>
+          <p:nvPr>
+            <p:ph type="title"/>
+          </p:nvPr>
+        </p:nvSpPr>
+        <p:spPr>
+          <a:xfrm>
+            <a:off x="1371600" y="141208"/>
+            <a:ext cx="9601200" cy="569991"/>
+          </a:xfrm>
+        </p:spPr>
+        <p:txBody>
+          <a:bodyPr>
+            <a:noAutofit/>
+          </a:bodyPr>
+          <a:lstStyle/>
+          <a:p>
+            <a:pPr algn="ctr"/>
+            <a:r>
+              <a:rPr lang="ru-RU" sz="3200" dirty="0"/>
+              <a:t>Демонстрация работы</a:t>
+            </a:r>
+          </a:p>
+        </p:txBody>
+      </p:sp>
+      <p:sp>
+        <p:nvSpPr>
+          <p:cNvPr id="3" name="Номер слайда 2"/>
+          <p:cNvSpPr>
+            <a:spLocks noGrp="1"/>
+          </p:cNvSpPr>
+          <p:nvPr>
+            <p:ph type="sldNum" sz="quarter" idx="12"/>
+          </p:nvPr>
+        </p:nvSpPr>
+        <p:spPr/>
+        <p:txBody>
+          <a:bodyPr/>
+          <a:lstStyle/>
+          <a:p>
+            <a:fld id="{97701FBD-09DE-4BDF-B53C-23B184A2051C}" type="slidenum">
+              <a:rPr lang="ru-RU" smtClean="0"/>
+              <a:t>17</a:t>
+            </a:fld>
+            <a:endParaRPr lang="ru-RU"/>
+          </a:p>
+        </p:txBody>
+      </p:sp>
+      <p:pic>
+        <p:nvPicPr>
+          <p:cNvPr id="9218" name="Picture 2"/>
+          <p:cNvPicPr>
+            <a:picLocks noChangeAspect="1" noChangeArrowheads="1"/>
+          </p:cNvPicPr>
+          <p:nvPr/>
+        </p:nvPicPr>
+        <p:blipFill>
+          <a:blip r:embed="rId2" cstate="print">
+            <a:extLst>
+              <a:ext uri="{28A0092B-C50C-407E-A947-70E740481C1C}">
+                <a14:useLocalDpi xmlns:a14="http://schemas.microsoft.com/office/drawing/2010/main" val="0"/>
+              </a:ext>
+            </a:extLst>
+          </a:blip>
+          <a:srcRect/>
+          <a:stretch>
+            <a:fillRect/>
+          </a:stretch>
+        </p:blipFill>
+        <p:spPr bwMode="auto">
+          <a:xfrm>
+            <a:off x="766762" y="2089605"/>
+            <a:ext cx="5619595" cy="3084893"/>
+          </a:xfrm>
+          <a:prstGeom prst="rect">
+            <a:avLst/>
+          </a:prstGeom>
+          <a:noFill/>
+          <a:ln>
+            <a:noFill/>
+          </a:ln>
+          <a:effectLst/>
+          <a:extLst>
+            <a:ext uri="{909E8E84-426E-40DD-AFC4-6F175D3DCCD1}">
+              <a14:hiddenFill xmlns:a14="http://schemas.microsoft.com/office/drawing/2010/main">
+                <a:solidFill>
+                  <a:schemeClr val="accent1"/>
+                </a:solidFill>
+              </a14:hiddenFill>
+            </a:ext>
+            <a:ext uri="{91240B29-F687-4F45-9708-019B960494DF}">
+              <a14:hiddenLine xmlns:a14="http://schemas.microsoft.com/office/drawing/2010/main" w="9525">
+                <a:solidFill>
+                  <a:schemeClr val="tx1"/>
+                </a:solidFill>
+                <a:miter lim="800000"/>
+                <a:headEnd/>
+                <a:tailEnd/>
+              </a14:hiddenLine>
+            </a:ext>
+            <a:ext uri="{AF507438-7753-43E0-B8FC-AC1667EBCBE1}">
+              <a14:hiddenEffects xmlns:a14="http://schemas.microsoft.com/office/drawing/2010/main">
+                <a:effectLst>
+                  <a:outerShdw dist="35921" dir="2700000" algn="ctr" rotWithShape="0">
+                    <a:schemeClr val="bg2"/>
+                  </a:outerShdw>
+                </a:effectLst>
+              </a14:hiddenEffects>
+            </a:ext>
+          </a:extLst>
+        </p:spPr>
+      </p:pic>
+      <p:pic>
+        <p:nvPicPr>
+          <p:cNvPr id="9219" name="Picture 3"/>
+          <p:cNvPicPr>
+            <a:picLocks noChangeAspect="1" noChangeArrowheads="1"/>
+          </p:cNvPicPr>
+          <p:nvPr/>
+        </p:nvPicPr>
+        <p:blipFill>
+          <a:blip r:embed="rId3" cstate="print">
+            <a:extLst>
+              <a:ext uri="{28A0092B-C50C-407E-A947-70E740481C1C}">
+                <a14:useLocalDpi xmlns:a14="http://schemas.microsoft.com/office/drawing/2010/main" val="0"/>
+              </a:ext>
+            </a:extLst>
+          </a:blip>
+          <a:srcRect/>
+          <a:stretch>
+            <a:fillRect/>
+          </a:stretch>
+        </p:blipFill>
+        <p:spPr bwMode="auto">
+          <a:xfrm>
+            <a:off x="5592763" y="634365"/>
+            <a:ext cx="6355397" cy="2991761"/>
+          </a:xfrm>
+          <a:prstGeom prst="rect">
+            <a:avLst/>
+          </a:prstGeom>
+          <a:noFill/>
+          <a:ln>
+            <a:noFill/>
+          </a:ln>
+          <a:effectLst/>
+          <a:extLst>
+            <a:ext uri="{909E8E84-426E-40DD-AFC4-6F175D3DCCD1}">
+              <a14:hiddenFill xmlns:a14="http://schemas.microsoft.com/office/drawing/2010/main">
+                <a:solidFill>
+                  <a:schemeClr val="accent1"/>
+                </a:solidFill>
+              </a14:hiddenFill>
+            </a:ext>
+            <a:ext uri="{91240B29-F687-4F45-9708-019B960494DF}">
+              <a14:hiddenLine xmlns:a14="http://schemas.microsoft.com/office/drawing/2010/main" w="9525">
+                <a:solidFill>
+                  <a:schemeClr val="tx1"/>
+                </a:solidFill>
+                <a:miter lim="800000"/>
+                <a:headEnd/>
+                <a:tailEnd/>
+              </a14:hiddenLine>
+            </a:ext>
+            <a:ext uri="{AF507438-7753-43E0-B8FC-AC1667EBCBE1}">
+              <a14:hiddenEffects xmlns:a14="http://schemas.microsoft.com/office/drawing/2010/main">
+                <a:effectLst>
+                  <a:outerShdw dist="35921" dir="2700000" algn="ctr" rotWithShape="0">
+                    <a:schemeClr val="bg2"/>
+                  </a:outerShdw>
+                </a:effectLst>
+              </a14:hiddenEffects>
+            </a:ext>
+          </a:extLst>
+        </p:spPr>
+      </p:pic>
+      <p:pic>
+        <p:nvPicPr>
+          <p:cNvPr id="9220" name="Picture 4"/>
+          <p:cNvPicPr>
+            <a:picLocks noChangeAspect="1" noChangeArrowheads="1"/>
+          </p:cNvPicPr>
+          <p:nvPr/>
+        </p:nvPicPr>
+        <p:blipFill>
+          <a:blip r:embed="rId4" cstate="print">
+            <a:extLst>
+              <a:ext uri="{28A0092B-C50C-407E-A947-70E740481C1C}">
+                <a14:useLocalDpi xmlns:a14="http://schemas.microsoft.com/office/drawing/2010/main" val="0"/>
+              </a:ext>
+            </a:extLst>
+          </a:blip>
+          <a:srcRect/>
+          <a:stretch>
+            <a:fillRect/>
+          </a:stretch>
+        </p:blipFill>
+        <p:spPr bwMode="auto">
+          <a:xfrm>
+            <a:off x="5624796" y="3779520"/>
+            <a:ext cx="6323364" cy="2926080"/>
+          </a:xfrm>
+          <a:prstGeom prst="rect">
+            <a:avLst/>
+          </a:prstGeom>
+          <a:noFill/>
+          <a:ln>
+            <a:noFill/>
+          </a:ln>
+          <a:effectLst/>
+          <a:extLst>
+            <a:ext uri="{909E8E84-426E-40DD-AFC4-6F175D3DCCD1}">
+              <a14:hiddenFill xmlns:a14="http://schemas.microsoft.com/office/drawing/2010/main">
+                <a:solidFill>
+                  <a:schemeClr val="accent1"/>
+                </a:solidFill>
+              </a14:hiddenFill>
+            </a:ext>
+            <a:ext uri="{91240B29-F687-4F45-9708-019B960494DF}">
+              <a14:hiddenLine xmlns:a14="http://schemas.microsoft.com/office/drawing/2010/main" w="9525">
+                <a:solidFill>
+                  <a:schemeClr val="tx1"/>
+                </a:solidFill>
+                <a:miter lim="800000"/>
+                <a:headEnd/>
+                <a:tailEnd/>
+              </a14:hiddenLine>
+            </a:ext>
+            <a:ext uri="{AF507438-7753-43E0-B8FC-AC1667EBCBE1}">
+              <a14:hiddenEffects xmlns:a14="http://schemas.microsoft.com/office/drawing/2010/main">
+                <a:effectLst>
+                  <a:outerShdw dist="35921" dir="2700000" algn="ctr" rotWithShape="0">
+                    <a:schemeClr val="bg2"/>
+                  </a:outerShdw>
+                </a:effectLst>
+              </a14:hiddenEffects>
+            </a:ext>
+          </a:extLst>
+        </p:spPr>
+      </p:pic>
+    </p:spTree>
+    <p:extLst>
+      <p:ext uri="{BB962C8B-B14F-4D97-AF65-F5344CB8AC3E}">
+        <p14:creationId xmlns:p14="http://schemas.microsoft.com/office/powerpoint/2010/main" val="2544387504"/>
+      </p:ext>
+    </p:extLst>
+  </p:cSld>
+  <p:clrMapOvr>
+    <a:masterClrMapping/>
+  </p:clrMapOvr>
+</p:sld>
+</file>
+
+<file path=ppt/slides/slide18.xml><?xml version="1.0" encoding="utf-8"?>
+<p:sld xmlns:a="http://schemas.openxmlformats.org/drawingml/2006/main" xmlns:r="http://schemas.openxmlformats.org/officeDocument/2006/relationships" xmlns:p="http://schemas.openxmlformats.org/presentationml/2006/main">
+  <p:cSld>
+    <p:spTree>
+      <p:nvGrpSpPr>
+        <p:cNvPr id="1" name=""/>
+        <p:cNvGrpSpPr/>
+        <p:nvPr/>
+      </p:nvGrpSpPr>
+      <p:grpSpPr>
+        <a:xfrm>
+          <a:off x="0" y="0"/>
+          <a:ext cx="0" cy="0"/>
+          <a:chOff x="0" y="0"/>
+          <a:chExt cx="0" cy="0"/>
+        </a:xfrm>
+      </p:grpSpPr>
+      <p:sp>
+        <p:nvSpPr>
+          <p:cNvPr id="2" name="Заголовок 1">
+            <a:extLst>
+              <a:ext uri="{FF2B5EF4-FFF2-40B4-BE49-F238E27FC236}">
                 <a16:creationId xmlns:a16="http://schemas.microsoft.com/office/drawing/2014/main" id="{36F55DD9-CAA4-EED6-C531-8A0313B1616B}"/>
               </a:ext>
             </a:extLst>
@@ -5783,7 +6066,7 @@
           <a:p>
             <a:fld id="{97701FBD-09DE-4BDF-B53C-23B184A2051C}" type="slidenum">
               <a:rPr lang="ru-RU" smtClean="0"/>
-              <a:t>16</a:t>
+              <a:t>18</a:t>
             </a:fld>
             <a:endParaRPr lang="ru-RU"/>
           </a:p>
@@ -5824,7 +6107,7 @@
           <p:cNvPr id="2" name="Заголовок 1">
             <a:extLst>
               <a:ext uri="{FF2B5EF4-FFF2-40B4-BE49-F238E27FC236}">
-                <a16:creationId xmlns:a16="http://schemas.microsoft.com/office/drawing/2014/main" id="{E5098CEA-47C9-5818-3D89-2573730D1698}"/>
+                <a16:creationId xmlns:a16="http://schemas.microsoft.com/office/drawing/2014/main" id="{C9AFA4D5-F016-9065-B2B7-76969D8B5E3E}"/>
               </a:ext>
             </a:extLst>
           </p:cNvPr>
@@ -5835,10 +6118,39 @@
             <p:ph type="title"/>
           </p:nvPr>
         </p:nvSpPr>
+        <p:spPr/>
+        <p:txBody>
+          <a:bodyPr/>
+          <a:lstStyle/>
+          <a:p>
+            <a:pPr algn="ctr"/>
+            <a:r>
+              <a:rPr lang="ru-RU" dirty="0"/>
+              <a:t>Цель проекта</a:t>
+            </a:r>
+          </a:p>
+        </p:txBody>
+      </p:sp>
+      <p:sp>
+        <p:nvSpPr>
+          <p:cNvPr id="3" name="Объект 2">
+            <a:extLst>
+              <a:ext uri="{FF2B5EF4-FFF2-40B4-BE49-F238E27FC236}">
+                <a16:creationId xmlns:a16="http://schemas.microsoft.com/office/drawing/2014/main" id="{B6D9E93B-D88E-530E-A848-B4A92E737901}"/>
+              </a:ext>
+            </a:extLst>
+          </p:cNvPr>
+          <p:cNvSpPr>
+            <a:spLocks noGrp="1"/>
+          </p:cNvSpPr>
+          <p:nvPr>
+            <p:ph idx="1"/>
+          </p:nvPr>
+        </p:nvSpPr>
         <p:spPr>
           <a:xfrm>
-            <a:off x="1404569" y="289560"/>
-            <a:ext cx="9601200" cy="675640"/>
+            <a:off x="1371600" y="2286000"/>
+            <a:ext cx="10403840" cy="3581400"/>
           </a:xfrm>
         </p:spPr>
         <p:txBody>
@@ -5847,351 +6159,22 @@
           </a:bodyPr>
           <a:lstStyle/>
           <a:p>
-            <a:pPr algn="ctr"/>
-            <a:r>
-              <a:rPr lang="ru-RU" sz="4000" dirty="0"/>
-              <a:t>О системе</a:t>
-            </a:r>
-          </a:p>
-        </p:txBody>
-      </p:sp>
-      <p:sp>
-        <p:nvSpPr>
-          <p:cNvPr id="4" name="Объект 3"/>
-          <p:cNvSpPr>
-            <a:spLocks noGrp="1"/>
-          </p:cNvSpPr>
-          <p:nvPr>
-            <p:ph idx="1"/>
-          </p:nvPr>
-        </p:nvSpPr>
-        <p:spPr>
-          <a:xfrm>
-            <a:off x="985520" y="1239520"/>
-            <a:ext cx="5455920" cy="4650740"/>
-          </a:xfrm>
-        </p:spPr>
-        <p:txBody>
-          <a:bodyPr>
-            <a:normAutofit/>
-          </a:bodyPr>
-          <a:lstStyle/>
-          <a:p>
-            <a:pPr marL="0" indent="0">
-              <a:buNone/>
-            </a:pPr>
-            <a:r>
-              <a:rPr lang="ru-RU" sz="2400" dirty="0"/>
-              <a:t>Врач:</a:t>
-            </a:r>
-          </a:p>
-          <a:p>
-            <a:pPr lvl="0"/>
-            <a:r>
-              <a:rPr lang="ru-RU" sz="2400" dirty="0"/>
-              <a:t>Может просматривать расписание приема пациентов;</a:t>
-            </a:r>
-          </a:p>
-          <a:p>
-            <a:pPr lvl="0"/>
-            <a:r>
-              <a:rPr lang="ru-RU" sz="2400" dirty="0"/>
-              <a:t>Может создавать, изменять и удалять записи на прием;</a:t>
-            </a:r>
-          </a:p>
-          <a:p>
-            <a:pPr lvl="0"/>
-            <a:r>
-              <a:rPr lang="ru-RU" sz="2400" dirty="0"/>
-              <a:t>Может просматривать медицинскую историю пациента;</a:t>
-            </a:r>
-          </a:p>
-          <a:p>
-            <a:pPr lvl="0"/>
-            <a:r>
-              <a:rPr lang="ru-RU" sz="2400" dirty="0"/>
-              <a:t>Может добавлять записи;</a:t>
-            </a:r>
-          </a:p>
-          <a:p>
-            <a:pPr lvl="0"/>
-            <a:r>
-              <a:rPr lang="ru-RU" sz="2400" dirty="0"/>
-              <a:t>Может вносить диагнозы и рекомендации для пациентов;</a:t>
-            </a:r>
-          </a:p>
-          <a:p>
-            <a:endParaRPr lang="ru-RU" sz="2400" dirty="0"/>
-          </a:p>
-          <a:p>
-            <a:pPr marL="0" indent="0">
-              <a:buNone/>
-            </a:pPr>
-            <a:endParaRPr lang="ru-RU" sz="2400" dirty="0"/>
-          </a:p>
-        </p:txBody>
-      </p:sp>
-      <p:sp>
-        <p:nvSpPr>
-          <p:cNvPr id="7" name="Объект 3"/>
-          <p:cNvSpPr txBox="1">
-            <a:spLocks/>
-          </p:cNvSpPr>
-          <p:nvPr/>
-        </p:nvSpPr>
-        <p:spPr>
-          <a:xfrm>
-            <a:off x="6532880" y="1239520"/>
-            <a:ext cx="5659120" cy="5618480"/>
-          </a:xfrm>
-          <a:prstGeom prst="rect">
-            <a:avLst/>
-          </a:prstGeom>
-        </p:spPr>
-        <p:txBody>
-          <a:bodyPr vert="horz" lIns="91440" tIns="45720" rIns="91440" bIns="45720" rtlCol="0">
-            <a:noAutofit/>
-          </a:bodyPr>
-          <a:lstStyle>
-            <a:lvl1pPr marL="384048" indent="-384048" algn="l" defTabSz="914400" rtl="0" eaLnBrk="1" latinLnBrk="0" hangingPunct="1">
-              <a:lnSpc>
-                <a:spcPct val="94000"/>
-              </a:lnSpc>
-              <a:spcBef>
-                <a:spcPts val="1000"/>
-              </a:spcBef>
-              <a:spcAft>
-                <a:spcPts val="200"/>
-              </a:spcAft>
-              <a:buFont typeface="Franklin Gothic Book" panose="020B0503020102020204" pitchFamily="34" charset="0"/>
-              <a:buChar char="■"/>
-              <a:defRPr sz="2000" kern="1200" baseline="0">
-                <a:solidFill>
-                  <a:schemeClr val="tx2"/>
-                </a:solidFill>
-                <a:latin typeface="+mn-lt"/>
-                <a:ea typeface="+mn-ea"/>
-                <a:cs typeface="+mn-cs"/>
-              </a:defRPr>
-            </a:lvl1pPr>
-            <a:lvl2pPr marL="914400" indent="-384048" algn="l" defTabSz="914400" rtl="0" eaLnBrk="1" latinLnBrk="0" hangingPunct="1">
-              <a:lnSpc>
-                <a:spcPct val="94000"/>
-              </a:lnSpc>
-              <a:spcBef>
-                <a:spcPts val="500"/>
-              </a:spcBef>
-              <a:spcAft>
-                <a:spcPts val="200"/>
-              </a:spcAft>
-              <a:buFont typeface="Franklin Gothic Book" panose="020B0503020102020204" pitchFamily="34" charset="0"/>
-              <a:buChar char="–"/>
-              <a:defRPr sz="2000" i="1" kern="1200" baseline="0">
-                <a:solidFill>
-                  <a:schemeClr val="tx2"/>
-                </a:solidFill>
-                <a:latin typeface="+mn-lt"/>
-                <a:ea typeface="+mn-ea"/>
-                <a:cs typeface="+mn-cs"/>
-              </a:defRPr>
-            </a:lvl2pPr>
-            <a:lvl3pPr marL="1371600" indent="-384048" algn="l" defTabSz="914400" rtl="0" eaLnBrk="1" latinLnBrk="0" hangingPunct="1">
-              <a:lnSpc>
-                <a:spcPct val="94000"/>
-              </a:lnSpc>
-              <a:spcBef>
-                <a:spcPts val="500"/>
-              </a:spcBef>
-              <a:spcAft>
-                <a:spcPts val="200"/>
-              </a:spcAft>
-              <a:buFont typeface="Franklin Gothic Book" panose="020B0503020102020204" pitchFamily="34" charset="0"/>
-              <a:buChar char="■"/>
-              <a:defRPr sz="1800" kern="1200" baseline="0">
-                <a:solidFill>
-                  <a:schemeClr val="tx2"/>
-                </a:solidFill>
-                <a:latin typeface="+mn-lt"/>
-                <a:ea typeface="+mn-ea"/>
-                <a:cs typeface="+mn-cs"/>
-              </a:defRPr>
-            </a:lvl3pPr>
-            <a:lvl4pPr marL="1828800" indent="-384048" algn="l" defTabSz="914400" rtl="0" eaLnBrk="1" latinLnBrk="0" hangingPunct="1">
-              <a:lnSpc>
-                <a:spcPct val="94000"/>
-              </a:lnSpc>
-              <a:spcBef>
-                <a:spcPts val="500"/>
-              </a:spcBef>
-              <a:spcAft>
-                <a:spcPts val="200"/>
-              </a:spcAft>
-              <a:buFont typeface="Franklin Gothic Book" panose="020B0503020102020204" pitchFamily="34" charset="0"/>
-              <a:buChar char="–"/>
-              <a:defRPr sz="1800" i="1" kern="1200" baseline="0">
-                <a:solidFill>
-                  <a:schemeClr val="tx2"/>
-                </a:solidFill>
-                <a:latin typeface="+mn-lt"/>
-                <a:ea typeface="+mn-ea"/>
-                <a:cs typeface="+mn-cs"/>
-              </a:defRPr>
-            </a:lvl4pPr>
-            <a:lvl5pPr marL="2286000" indent="-384048" algn="l" defTabSz="914400" rtl="0" eaLnBrk="1" latinLnBrk="0" hangingPunct="1">
-              <a:lnSpc>
-                <a:spcPct val="94000"/>
-              </a:lnSpc>
-              <a:spcBef>
-                <a:spcPts val="500"/>
-              </a:spcBef>
-              <a:spcAft>
-                <a:spcPts val="200"/>
-              </a:spcAft>
-              <a:buFont typeface="Franklin Gothic Book" panose="020B0503020102020204" pitchFamily="34" charset="0"/>
-              <a:buChar char="■"/>
-              <a:defRPr sz="1600" kern="1200" baseline="0">
-                <a:solidFill>
-                  <a:schemeClr val="tx2"/>
-                </a:solidFill>
-                <a:latin typeface="+mn-lt"/>
-                <a:ea typeface="+mn-ea"/>
-                <a:cs typeface="+mn-cs"/>
-              </a:defRPr>
-            </a:lvl5pPr>
-            <a:lvl6pPr marL="2743200" indent="-384048" algn="l" defTabSz="914400" rtl="0" eaLnBrk="1" latinLnBrk="0" hangingPunct="1">
-              <a:lnSpc>
-                <a:spcPct val="94000"/>
-              </a:lnSpc>
-              <a:spcBef>
-                <a:spcPts val="500"/>
-              </a:spcBef>
-              <a:spcAft>
-                <a:spcPts val="200"/>
-              </a:spcAft>
-              <a:buFont typeface="Franklin Gothic Book" panose="020B0503020102020204" pitchFamily="34" charset="0"/>
-              <a:buChar char="–"/>
-              <a:defRPr sz="1600" i="1" kern="1200" baseline="0">
-                <a:solidFill>
-                  <a:schemeClr val="tx2"/>
-                </a:solidFill>
-                <a:latin typeface="+mn-lt"/>
-                <a:ea typeface="+mn-ea"/>
-                <a:cs typeface="+mn-cs"/>
-              </a:defRPr>
-            </a:lvl6pPr>
-            <a:lvl7pPr marL="3200400" indent="-384048" algn="l" defTabSz="914400" rtl="0" eaLnBrk="1" latinLnBrk="0" hangingPunct="1">
-              <a:lnSpc>
-                <a:spcPct val="94000"/>
-              </a:lnSpc>
-              <a:spcBef>
-                <a:spcPts val="500"/>
-              </a:spcBef>
-              <a:spcAft>
-                <a:spcPts val="200"/>
-              </a:spcAft>
-              <a:buFont typeface="Franklin Gothic Book" panose="020B0503020102020204" pitchFamily="34" charset="0"/>
-              <a:buChar char="■"/>
-              <a:defRPr sz="1400" kern="1200" baseline="0">
-                <a:solidFill>
-                  <a:schemeClr val="tx2"/>
-                </a:solidFill>
-                <a:latin typeface="+mn-lt"/>
-                <a:ea typeface="+mn-ea"/>
-                <a:cs typeface="+mn-cs"/>
-              </a:defRPr>
-            </a:lvl7pPr>
-            <a:lvl8pPr marL="3657600" indent="-384048" algn="l" defTabSz="914400" rtl="0" eaLnBrk="1" latinLnBrk="0" hangingPunct="1">
-              <a:lnSpc>
-                <a:spcPct val="94000"/>
-              </a:lnSpc>
-              <a:spcBef>
-                <a:spcPts val="500"/>
-              </a:spcBef>
-              <a:spcAft>
-                <a:spcPts val="200"/>
-              </a:spcAft>
-              <a:buFont typeface="Franklin Gothic Book" panose="020B0503020102020204" pitchFamily="34" charset="0"/>
-              <a:buChar char="–"/>
-              <a:defRPr sz="1400" i="1" kern="1200" baseline="0">
-                <a:solidFill>
-                  <a:schemeClr val="tx2"/>
-                </a:solidFill>
-                <a:latin typeface="+mn-lt"/>
-                <a:ea typeface="+mn-ea"/>
-                <a:cs typeface="+mn-cs"/>
-              </a:defRPr>
-            </a:lvl8pPr>
-            <a:lvl9pPr marL="4114800" indent="-384048" algn="l" defTabSz="914400" rtl="0" eaLnBrk="1" latinLnBrk="0" hangingPunct="1">
-              <a:lnSpc>
-                <a:spcPct val="94000"/>
-              </a:lnSpc>
-              <a:spcBef>
-                <a:spcPts val="500"/>
-              </a:spcBef>
-              <a:spcAft>
-                <a:spcPts val="200"/>
-              </a:spcAft>
-              <a:buFont typeface="Franklin Gothic Book" panose="020B0503020102020204" pitchFamily="34" charset="0"/>
-              <a:buChar char="■"/>
-              <a:defRPr sz="1400" kern="1200" baseline="0">
-                <a:solidFill>
-                  <a:schemeClr val="tx2"/>
-                </a:solidFill>
-                <a:latin typeface="+mn-lt"/>
-                <a:ea typeface="+mn-ea"/>
-                <a:cs typeface="+mn-cs"/>
-              </a:defRPr>
-            </a:lvl9pPr>
-          </a:lstStyle>
-          <a:p>
-            <a:pPr marL="0" indent="0">
-              <a:buNone/>
-            </a:pPr>
-            <a:r>
-              <a:rPr lang="ru-RU" sz="2400" dirty="0"/>
-              <a:t>Регистратор:</a:t>
-            </a:r>
-          </a:p>
-          <a:p>
-            <a:pPr lvl="0"/>
-            <a:r>
-              <a:rPr lang="ru-RU" sz="2400" dirty="0"/>
-              <a:t>Может создавать новых пациентов в системе;</a:t>
-            </a:r>
-          </a:p>
-          <a:p>
-            <a:pPr lvl="0"/>
-            <a:r>
-              <a:rPr lang="ru-RU" sz="2400" dirty="0"/>
-              <a:t>Может записывать пациентов на прием к врачам;</a:t>
-            </a:r>
-          </a:p>
-          <a:p>
-            <a:pPr lvl="0"/>
-            <a:r>
-              <a:rPr lang="ru-RU" sz="2400" dirty="0"/>
-              <a:t>Может просматривать и редактировать информацию о пациентах;</a:t>
-            </a:r>
-          </a:p>
-          <a:p>
-            <a:pPr lvl="0"/>
-            <a:r>
-              <a:rPr lang="ru-RU" sz="2400" dirty="0"/>
-              <a:t>Может проверять доступность и свободное время в расписании врачей;</a:t>
-            </a:r>
-          </a:p>
-          <a:p>
-            <a:pPr marL="0" indent="0">
-              <a:buFont typeface="Franklin Gothic Book" panose="020B0503020102020204" pitchFamily="34" charset="0"/>
-              <a:buNone/>
-            </a:pPr>
-            <a:endParaRPr lang="ru-RU" sz="2400" dirty="0"/>
-          </a:p>
-        </p:txBody>
-      </p:sp>
-      <p:sp>
-        <p:nvSpPr>
-          <p:cNvPr id="6" name="Номер слайда 5"/>
+            <a:r>
+              <a:rPr lang="ru-RU" sz="2800" dirty="0"/>
+              <a:t>Основная цель проекта – это разработать централизованную систему здравоохранения, позволяющую усовершенствовать информационную и программную поддержку основных процессов поликлиник. </a:t>
+            </a:r>
+          </a:p>
+        </p:txBody>
+      </p:sp>
+      <p:sp>
+        <p:nvSpPr>
+          <p:cNvPr id="4" name="Номер слайда 3">
+            <a:extLst>
+              <a:ext uri="{FF2B5EF4-FFF2-40B4-BE49-F238E27FC236}">
+                <a16:creationId xmlns:a16="http://schemas.microsoft.com/office/drawing/2014/main" id="{EA7E5E3C-4CF5-2E23-A52A-669E4F37F2DC}"/>
+              </a:ext>
+            </a:extLst>
+          </p:cNvPr>
           <p:cNvSpPr>
             <a:spLocks noGrp="1"/>
           </p:cNvSpPr>
@@ -6215,7 +6198,7 @@
     </p:spTree>
     <p:extLst>
       <p:ext uri="{BB962C8B-B14F-4D97-AF65-F5344CB8AC3E}">
-        <p14:creationId xmlns:p14="http://schemas.microsoft.com/office/powerpoint/2010/main" val="3623626667"/>
+        <p14:creationId xmlns:p14="http://schemas.microsoft.com/office/powerpoint/2010/main" val="3067841788"/>
       </p:ext>
     </p:extLst>
   </p:cSld>
@@ -6247,7 +6230,7 @@
           <p:cNvPr id="2" name="Заголовок 1">
             <a:extLst>
               <a:ext uri="{FF2B5EF4-FFF2-40B4-BE49-F238E27FC236}">
-                <a16:creationId xmlns:a16="http://schemas.microsoft.com/office/drawing/2014/main" id="{E8E0D8E1-BC96-F0D1-8711-F1A9313690DB}"/>
+                <a16:creationId xmlns:a16="http://schemas.microsoft.com/office/drawing/2014/main" id="{F624A74D-EC9B-8D3E-E88B-DA00CC643ADC}"/>
               </a:ext>
             </a:extLst>
           </p:cNvPr>
@@ -6260,36 +6243,64 @@
         </p:nvSpPr>
         <p:spPr>
           <a:xfrm>
-            <a:off x="1371600" y="218440"/>
-            <a:ext cx="10820400" cy="665480"/>
-          </a:xfrm>
-        </p:spPr>
-        <p:txBody>
-          <a:bodyPr>
-            <a:noAutofit/>
-          </a:bodyPr>
+            <a:off x="1467828" y="0"/>
+            <a:ext cx="9601200" cy="1485900"/>
+          </a:xfrm>
+        </p:spPr>
+        <p:txBody>
+          <a:bodyPr/>
           <a:lstStyle/>
           <a:p>
             <a:pPr algn="ctr"/>
             <a:r>
-              <a:rPr lang="ru-RU" sz="4000" dirty="0">
-                <a:latin typeface="Times New Roman" pitchFamily="18" charset="0"/>
-                <a:cs typeface="Times New Roman" pitchFamily="18" charset="0"/>
-              </a:rPr>
-              <a:t>Общие принципы организации системы</a:t>
-            </a:r>
+              <a:rPr lang="ru-RU" dirty="0"/>
+              <a:t>Проблема и решение</a:t>
+            </a:r>
+          </a:p>
+        </p:txBody>
+      </p:sp>
+      <p:sp>
+        <p:nvSpPr>
+          <p:cNvPr id="4" name="Номер слайда 3">
+            <a:extLst>
+              <a:ext uri="{FF2B5EF4-FFF2-40B4-BE49-F238E27FC236}">
+                <a16:creationId xmlns:a16="http://schemas.microsoft.com/office/drawing/2014/main" id="{F92081E0-D6EB-A2FC-03EE-79A1F8DCD603}"/>
+              </a:ext>
+            </a:extLst>
+          </p:cNvPr>
+          <p:cNvSpPr>
+            <a:spLocks noGrp="1"/>
+          </p:cNvSpPr>
+          <p:nvPr>
+            <p:ph type="sldNum" sz="quarter" idx="12"/>
+          </p:nvPr>
+        </p:nvSpPr>
+        <p:spPr/>
+        <p:txBody>
+          <a:bodyPr/>
+          <a:lstStyle/>
+          <a:p>
+            <a:fld id="{97701FBD-09DE-4BDF-B53C-23B184A2051C}" type="slidenum">
+              <a:rPr lang="ru-RU" smtClean="0"/>
+              <a:t>3</a:t>
+            </a:fld>
+            <a:endParaRPr lang="ru-RU"/>
           </a:p>
         </p:txBody>
       </p:sp>
       <p:pic>
         <p:nvPicPr>
-          <p:cNvPr id="2050" name="Picture 2" descr="C:\Users\vladb\Desktop\6252ab051e670d13f9599d59_REST-API-Image_c0dd9870585de555571305f8b182d4828de0c889.png"/>
+          <p:cNvPr id="6" name="Рисунок 5">
+            <a:extLst>
+              <a:ext uri="{FF2B5EF4-FFF2-40B4-BE49-F238E27FC236}">
+                <a16:creationId xmlns:a16="http://schemas.microsoft.com/office/drawing/2014/main" id="{B858B7D9-DBC4-B200-414B-27B73094D9BB}"/>
+              </a:ext>
+            </a:extLst>
+          </p:cNvPr>
           <p:cNvPicPr>
-            <a:picLocks noGrp="1" noChangeAspect="1" noChangeArrowheads="1"/>
+            <a:picLocks noChangeAspect="1"/>
           </p:cNvPicPr>
-          <p:nvPr>
-            <p:ph idx="1"/>
-          </p:nvPr>
+          <p:nvPr/>
         </p:nvPicPr>
         <p:blipFill>
           <a:blip r:embed="rId2">
@@ -6299,58 +6310,60 @@
               </a:ext>
             </a:extLst>
           </a:blip>
-          <a:srcRect/>
           <a:stretch>
             <a:fillRect/>
           </a:stretch>
         </p:blipFill>
-        <p:spPr bwMode="auto">
-          <a:xfrm>
-            <a:off x="2717800" y="1535053"/>
-            <a:ext cx="8127999" cy="4267199"/>
+        <p:spPr>
+          <a:xfrm>
+            <a:off x="6197308" y="1082023"/>
+            <a:ext cx="5721784" cy="3810034"/>
           </a:xfrm>
           <a:prstGeom prst="rect">
             <a:avLst/>
           </a:prstGeom>
-          <a:noFill/>
-          <a:extLst>
-            <a:ext uri="{909E8E84-426E-40DD-AFC4-6F175D3DCCD1}">
-              <a14:hiddenFill xmlns:a14="http://schemas.microsoft.com/office/drawing/2010/main">
-                <a:solidFill>
-                  <a:srgbClr val="FFFFFF"/>
-                </a:solidFill>
-              </a14:hiddenFill>
-            </a:ext>
-          </a:extLst>
         </p:spPr>
       </p:pic>
-      <p:sp>
-        <p:nvSpPr>
-          <p:cNvPr id="5" name="Номер слайда 4"/>
-          <p:cNvSpPr>
-            <a:spLocks noGrp="1"/>
-          </p:cNvSpPr>
-          <p:nvPr>
-            <p:ph type="sldNum" sz="quarter" idx="12"/>
-          </p:nvPr>
-        </p:nvSpPr>
-        <p:spPr/>
-        <p:txBody>
-          <a:bodyPr/>
-          <a:lstStyle/>
-          <a:p>
-            <a:fld id="{97701FBD-09DE-4BDF-B53C-23B184A2051C}" type="slidenum">
-              <a:rPr lang="ru-RU" smtClean="0"/>
-              <a:t>3</a:t>
-            </a:fld>
-            <a:endParaRPr lang="ru-RU"/>
-          </a:p>
-        </p:txBody>
-      </p:sp>
+      <p:pic>
+        <p:nvPicPr>
+          <p:cNvPr id="12" name="Рисунок 11">
+            <a:extLst>
+              <a:ext uri="{FF2B5EF4-FFF2-40B4-BE49-F238E27FC236}">
+                <a16:creationId xmlns:a16="http://schemas.microsoft.com/office/drawing/2014/main" id="{50645A9C-2D93-9839-0B83-601013E7B899}"/>
+              </a:ext>
+            </a:extLst>
+          </p:cNvPr>
+          <p:cNvPicPr>
+            <a:picLocks noChangeAspect="1"/>
+          </p:cNvPicPr>
+          <p:nvPr/>
+        </p:nvPicPr>
+        <p:blipFill>
+          <a:blip r:embed="rId3">
+            <a:extLst>
+              <a:ext uri="{28A0092B-C50C-407E-A947-70E740481C1C}">
+                <a14:useLocalDpi xmlns:a14="http://schemas.microsoft.com/office/drawing/2010/main" val="0"/>
+              </a:ext>
+            </a:extLst>
+          </a:blip>
+          <a:stretch>
+            <a:fillRect/>
+          </a:stretch>
+        </p:blipFill>
+        <p:spPr>
+          <a:xfrm>
+            <a:off x="839894" y="2713615"/>
+            <a:ext cx="5256106" cy="3942078"/>
+          </a:xfrm>
+          <a:prstGeom prst="rect">
+            <a:avLst/>
+          </a:prstGeom>
+        </p:spPr>
+      </p:pic>
     </p:spTree>
     <p:extLst>
       <p:ext uri="{BB962C8B-B14F-4D97-AF65-F5344CB8AC3E}">
-        <p14:creationId xmlns:p14="http://schemas.microsoft.com/office/powerpoint/2010/main" val="333117324"/>
+        <p14:creationId xmlns:p14="http://schemas.microsoft.com/office/powerpoint/2010/main" val="791279688"/>
       </p:ext>
     </p:extLst>
   </p:cSld>
@@ -6382,7 +6395,7 @@
           <p:cNvPr id="2" name="Заголовок 1">
             <a:extLst>
               <a:ext uri="{FF2B5EF4-FFF2-40B4-BE49-F238E27FC236}">
-                <a16:creationId xmlns:a16="http://schemas.microsoft.com/office/drawing/2014/main" id="{F15CBDFC-06C4-0019-13CB-25CAB2B21ACC}"/>
+                <a16:creationId xmlns:a16="http://schemas.microsoft.com/office/drawing/2014/main" id="{E5098CEA-47C9-5818-3D89-2573730D1698}"/>
               </a:ext>
             </a:extLst>
           </p:cNvPr>
@@ -6395,92 +6408,361 @@
         </p:nvSpPr>
         <p:spPr>
           <a:xfrm>
-            <a:off x="2788920" y="0"/>
-            <a:ext cx="7787640" cy="599440"/>
+            <a:off x="1404569" y="289560"/>
+            <a:ext cx="9601200" cy="675640"/>
           </a:xfrm>
         </p:spPr>
         <p:txBody>
           <a:bodyPr>
-            <a:noAutofit/>
+            <a:normAutofit/>
           </a:bodyPr>
           <a:lstStyle/>
           <a:p>
+            <a:pPr algn="ctr"/>
             <a:r>
               <a:rPr lang="ru-RU" sz="4000" dirty="0"/>
-              <a:t>Диаграмма классов-сущностей</a:t>
-            </a:r>
-          </a:p>
-        </p:txBody>
-      </p:sp>
-      <p:pic>
-        <p:nvPicPr>
-          <p:cNvPr id="1026" name="Picture 2"/>
-          <p:cNvPicPr>
-            <a:picLocks noGrp="1" noChangeAspect="1" noChangeArrowheads="1"/>
-          </p:cNvPicPr>
+              <a:t>О системе</a:t>
+            </a:r>
+          </a:p>
+        </p:txBody>
+      </p:sp>
+      <p:sp>
+        <p:nvSpPr>
+          <p:cNvPr id="4" name="Объект 3"/>
+          <p:cNvSpPr>
+            <a:spLocks noGrp="1"/>
+          </p:cNvSpPr>
           <p:nvPr>
             <p:ph idx="1"/>
           </p:nvPr>
-        </p:nvPicPr>
-        <p:blipFill>
-          <a:blip r:embed="rId3" cstate="print">
-            <a:extLst>
-              <a:ext uri="{28A0092B-C50C-407E-A947-70E740481C1C}">
-                <a14:useLocalDpi xmlns:a14="http://schemas.microsoft.com/office/drawing/2010/main" val="0"/>
-              </a:ext>
-            </a:extLst>
-          </a:blip>
-          <a:srcRect/>
-          <a:stretch>
-            <a:fillRect/>
-          </a:stretch>
-        </p:blipFill>
-        <p:spPr bwMode="auto">
-          <a:xfrm>
-            <a:off x="2836636" y="637326"/>
-            <a:ext cx="6835684" cy="6232632"/>
+        </p:nvSpPr>
+        <p:spPr>
+          <a:xfrm>
+            <a:off x="985520" y="1239520"/>
+            <a:ext cx="5455920" cy="4650740"/>
+          </a:xfrm>
+        </p:spPr>
+        <p:txBody>
+          <a:bodyPr>
+            <a:normAutofit/>
+          </a:bodyPr>
+          <a:lstStyle/>
+          <a:p>
+            <a:pPr marL="0" indent="0">
+              <a:buNone/>
+            </a:pPr>
+            <a:r>
+              <a:rPr lang="ru-RU" sz="2400" dirty="0"/>
+              <a:t>Врач:</a:t>
+            </a:r>
+          </a:p>
+          <a:p>
+            <a:pPr lvl="0"/>
+            <a:r>
+              <a:rPr lang="ru-RU" sz="2400" dirty="0"/>
+              <a:t>Может просматривать расписание приема пациентов;</a:t>
+            </a:r>
+          </a:p>
+          <a:p>
+            <a:pPr lvl="0"/>
+            <a:r>
+              <a:rPr lang="ru-RU" sz="2400" dirty="0"/>
+              <a:t>Может создавать, изменять и удалять записи на прием;</a:t>
+            </a:r>
+          </a:p>
+          <a:p>
+            <a:pPr lvl="0"/>
+            <a:r>
+              <a:rPr lang="ru-RU" sz="2400" dirty="0"/>
+              <a:t>Может просматривать медицинскую историю пациента;</a:t>
+            </a:r>
+          </a:p>
+          <a:p>
+            <a:pPr lvl="0"/>
+            <a:r>
+              <a:rPr lang="ru-RU" sz="2400" dirty="0"/>
+              <a:t>Может добавлять записи;</a:t>
+            </a:r>
+          </a:p>
+          <a:p>
+            <a:pPr lvl="0"/>
+            <a:r>
+              <a:rPr lang="ru-RU" sz="2400" dirty="0"/>
+              <a:t>Может вносить диагнозы и рекомендации для пациентов;</a:t>
+            </a:r>
+          </a:p>
+          <a:p>
+            <a:endParaRPr lang="ru-RU" sz="2400" dirty="0"/>
+          </a:p>
+          <a:p>
+            <a:pPr marL="0" indent="0">
+              <a:buNone/>
+            </a:pPr>
+            <a:endParaRPr lang="ru-RU" sz="2400" dirty="0"/>
+          </a:p>
+        </p:txBody>
+      </p:sp>
+      <p:sp>
+        <p:nvSpPr>
+          <p:cNvPr id="7" name="Объект 3"/>
+          <p:cNvSpPr txBox="1">
+            <a:spLocks/>
+          </p:cNvSpPr>
+          <p:nvPr/>
+        </p:nvSpPr>
+        <p:spPr>
+          <a:xfrm>
+            <a:off x="6532880" y="1239520"/>
+            <a:ext cx="5659120" cy="5618480"/>
           </a:xfrm>
           <a:prstGeom prst="rect">
             <a:avLst/>
           </a:prstGeom>
-          <a:noFill/>
-          <a:ln>
-            <a:noFill/>
-          </a:ln>
-          <a:effectLst/>
-          <a:extLst>
-            <a:ext uri="{909E8E84-426E-40DD-AFC4-6F175D3DCCD1}">
-              <a14:hiddenFill xmlns:a14="http://schemas.microsoft.com/office/drawing/2010/main">
-                <a:solidFill>
-                  <a:schemeClr val="accent1"/>
-                </a:solidFill>
-              </a14:hiddenFill>
-            </a:ext>
-            <a:ext uri="{91240B29-F687-4F45-9708-019B960494DF}">
-              <a14:hiddenLine xmlns:a14="http://schemas.microsoft.com/office/drawing/2010/main" w="9525">
-                <a:solidFill>
-                  <a:schemeClr val="tx1"/>
-                </a:solidFill>
-                <a:miter lim="800000"/>
-                <a:headEnd/>
-                <a:tailEnd/>
-              </a14:hiddenLine>
-            </a:ext>
-            <a:ext uri="{AF507438-7753-43E0-B8FC-AC1667EBCBE1}">
-              <a14:hiddenEffects xmlns:a14="http://schemas.microsoft.com/office/drawing/2010/main">
-                <a:effectLst>
-                  <a:outerShdw dist="35921" dir="2700000" algn="ctr" rotWithShape="0">
-                    <a:schemeClr val="bg2"/>
-                  </a:outerShdw>
-                </a:effectLst>
-              </a14:hiddenEffects>
-            </a:ext>
-          </a:extLst>
-        </p:spPr>
-      </p:pic>
-      <p:sp>
-        <p:nvSpPr>
-          <p:cNvPr id="4" name="Номер слайда 3"/>
+        </p:spPr>
+        <p:txBody>
+          <a:bodyPr vert="horz" lIns="91440" tIns="45720" rIns="91440" bIns="45720" rtlCol="0">
+            <a:noAutofit/>
+          </a:bodyPr>
+          <a:lstStyle>
+            <a:lvl1pPr marL="384048" indent="-384048" algn="l" defTabSz="914400" rtl="0" eaLnBrk="1" latinLnBrk="0" hangingPunct="1">
+              <a:lnSpc>
+                <a:spcPct val="94000"/>
+              </a:lnSpc>
+              <a:spcBef>
+                <a:spcPts val="1000"/>
+              </a:spcBef>
+              <a:spcAft>
+                <a:spcPts val="200"/>
+              </a:spcAft>
+              <a:buFont typeface="Franklin Gothic Book" panose="020B0503020102020204" pitchFamily="34" charset="0"/>
+              <a:buChar char="■"/>
+              <a:defRPr sz="2000" kern="1200" baseline="0">
+                <a:solidFill>
+                  <a:schemeClr val="tx2"/>
+                </a:solidFill>
+                <a:latin typeface="+mn-lt"/>
+                <a:ea typeface="+mn-ea"/>
+                <a:cs typeface="+mn-cs"/>
+              </a:defRPr>
+            </a:lvl1pPr>
+            <a:lvl2pPr marL="914400" indent="-384048" algn="l" defTabSz="914400" rtl="0" eaLnBrk="1" latinLnBrk="0" hangingPunct="1">
+              <a:lnSpc>
+                <a:spcPct val="94000"/>
+              </a:lnSpc>
+              <a:spcBef>
+                <a:spcPts val="500"/>
+              </a:spcBef>
+              <a:spcAft>
+                <a:spcPts val="200"/>
+              </a:spcAft>
+              <a:buFont typeface="Franklin Gothic Book" panose="020B0503020102020204" pitchFamily="34" charset="0"/>
+              <a:buChar char="–"/>
+              <a:defRPr sz="2000" i="1" kern="1200" baseline="0">
+                <a:solidFill>
+                  <a:schemeClr val="tx2"/>
+                </a:solidFill>
+                <a:latin typeface="+mn-lt"/>
+                <a:ea typeface="+mn-ea"/>
+                <a:cs typeface="+mn-cs"/>
+              </a:defRPr>
+            </a:lvl2pPr>
+            <a:lvl3pPr marL="1371600" indent="-384048" algn="l" defTabSz="914400" rtl="0" eaLnBrk="1" latinLnBrk="0" hangingPunct="1">
+              <a:lnSpc>
+                <a:spcPct val="94000"/>
+              </a:lnSpc>
+              <a:spcBef>
+                <a:spcPts val="500"/>
+              </a:spcBef>
+              <a:spcAft>
+                <a:spcPts val="200"/>
+              </a:spcAft>
+              <a:buFont typeface="Franklin Gothic Book" panose="020B0503020102020204" pitchFamily="34" charset="0"/>
+              <a:buChar char="■"/>
+              <a:defRPr sz="1800" kern="1200" baseline="0">
+                <a:solidFill>
+                  <a:schemeClr val="tx2"/>
+                </a:solidFill>
+                <a:latin typeface="+mn-lt"/>
+                <a:ea typeface="+mn-ea"/>
+                <a:cs typeface="+mn-cs"/>
+              </a:defRPr>
+            </a:lvl3pPr>
+            <a:lvl4pPr marL="1828800" indent="-384048" algn="l" defTabSz="914400" rtl="0" eaLnBrk="1" latinLnBrk="0" hangingPunct="1">
+              <a:lnSpc>
+                <a:spcPct val="94000"/>
+              </a:lnSpc>
+              <a:spcBef>
+                <a:spcPts val="500"/>
+              </a:spcBef>
+              <a:spcAft>
+                <a:spcPts val="200"/>
+              </a:spcAft>
+              <a:buFont typeface="Franklin Gothic Book" panose="020B0503020102020204" pitchFamily="34" charset="0"/>
+              <a:buChar char="–"/>
+              <a:defRPr sz="1800" i="1" kern="1200" baseline="0">
+                <a:solidFill>
+                  <a:schemeClr val="tx2"/>
+                </a:solidFill>
+                <a:latin typeface="+mn-lt"/>
+                <a:ea typeface="+mn-ea"/>
+                <a:cs typeface="+mn-cs"/>
+              </a:defRPr>
+            </a:lvl4pPr>
+            <a:lvl5pPr marL="2286000" indent="-384048" algn="l" defTabSz="914400" rtl="0" eaLnBrk="1" latinLnBrk="0" hangingPunct="1">
+              <a:lnSpc>
+                <a:spcPct val="94000"/>
+              </a:lnSpc>
+              <a:spcBef>
+                <a:spcPts val="500"/>
+              </a:spcBef>
+              <a:spcAft>
+                <a:spcPts val="200"/>
+              </a:spcAft>
+              <a:buFont typeface="Franklin Gothic Book" panose="020B0503020102020204" pitchFamily="34" charset="0"/>
+              <a:buChar char="■"/>
+              <a:defRPr sz="1600" kern="1200" baseline="0">
+                <a:solidFill>
+                  <a:schemeClr val="tx2"/>
+                </a:solidFill>
+                <a:latin typeface="+mn-lt"/>
+                <a:ea typeface="+mn-ea"/>
+                <a:cs typeface="+mn-cs"/>
+              </a:defRPr>
+            </a:lvl5pPr>
+            <a:lvl6pPr marL="2743200" indent="-384048" algn="l" defTabSz="914400" rtl="0" eaLnBrk="1" latinLnBrk="0" hangingPunct="1">
+              <a:lnSpc>
+                <a:spcPct val="94000"/>
+              </a:lnSpc>
+              <a:spcBef>
+                <a:spcPts val="500"/>
+              </a:spcBef>
+              <a:spcAft>
+                <a:spcPts val="200"/>
+              </a:spcAft>
+              <a:buFont typeface="Franklin Gothic Book" panose="020B0503020102020204" pitchFamily="34" charset="0"/>
+              <a:buChar char="–"/>
+              <a:defRPr sz="1600" i="1" kern="1200" baseline="0">
+                <a:solidFill>
+                  <a:schemeClr val="tx2"/>
+                </a:solidFill>
+                <a:latin typeface="+mn-lt"/>
+                <a:ea typeface="+mn-ea"/>
+                <a:cs typeface="+mn-cs"/>
+              </a:defRPr>
+            </a:lvl6pPr>
+            <a:lvl7pPr marL="3200400" indent="-384048" algn="l" defTabSz="914400" rtl="0" eaLnBrk="1" latinLnBrk="0" hangingPunct="1">
+              <a:lnSpc>
+                <a:spcPct val="94000"/>
+              </a:lnSpc>
+              <a:spcBef>
+                <a:spcPts val="500"/>
+              </a:spcBef>
+              <a:spcAft>
+                <a:spcPts val="200"/>
+              </a:spcAft>
+              <a:buFont typeface="Franklin Gothic Book" panose="020B0503020102020204" pitchFamily="34" charset="0"/>
+              <a:buChar char="■"/>
+              <a:defRPr sz="1400" kern="1200" baseline="0">
+                <a:solidFill>
+                  <a:schemeClr val="tx2"/>
+                </a:solidFill>
+                <a:latin typeface="+mn-lt"/>
+                <a:ea typeface="+mn-ea"/>
+                <a:cs typeface="+mn-cs"/>
+              </a:defRPr>
+            </a:lvl7pPr>
+            <a:lvl8pPr marL="3657600" indent="-384048" algn="l" defTabSz="914400" rtl="0" eaLnBrk="1" latinLnBrk="0" hangingPunct="1">
+              <a:lnSpc>
+                <a:spcPct val="94000"/>
+              </a:lnSpc>
+              <a:spcBef>
+                <a:spcPts val="500"/>
+              </a:spcBef>
+              <a:spcAft>
+                <a:spcPts val="200"/>
+              </a:spcAft>
+              <a:buFont typeface="Franklin Gothic Book" panose="020B0503020102020204" pitchFamily="34" charset="0"/>
+              <a:buChar char="–"/>
+              <a:defRPr sz="1400" i="1" kern="1200" baseline="0">
+                <a:solidFill>
+                  <a:schemeClr val="tx2"/>
+                </a:solidFill>
+                <a:latin typeface="+mn-lt"/>
+                <a:ea typeface="+mn-ea"/>
+                <a:cs typeface="+mn-cs"/>
+              </a:defRPr>
+            </a:lvl8pPr>
+            <a:lvl9pPr marL="4114800" indent="-384048" algn="l" defTabSz="914400" rtl="0" eaLnBrk="1" latinLnBrk="0" hangingPunct="1">
+              <a:lnSpc>
+                <a:spcPct val="94000"/>
+              </a:lnSpc>
+              <a:spcBef>
+                <a:spcPts val="500"/>
+              </a:spcBef>
+              <a:spcAft>
+                <a:spcPts val="200"/>
+              </a:spcAft>
+              <a:buFont typeface="Franklin Gothic Book" panose="020B0503020102020204" pitchFamily="34" charset="0"/>
+              <a:buChar char="■"/>
+              <a:defRPr sz="1400" kern="1200" baseline="0">
+                <a:solidFill>
+                  <a:schemeClr val="tx2"/>
+                </a:solidFill>
+                <a:latin typeface="+mn-lt"/>
+                <a:ea typeface="+mn-ea"/>
+                <a:cs typeface="+mn-cs"/>
+              </a:defRPr>
+            </a:lvl9pPr>
+          </a:lstStyle>
+          <a:p>
+            <a:pPr marL="0" indent="0">
+              <a:buNone/>
+            </a:pPr>
+            <a:r>
+              <a:rPr lang="ru-RU" sz="2400" dirty="0"/>
+              <a:t>Регистратор:</a:t>
+            </a:r>
+          </a:p>
+          <a:p>
+            <a:pPr lvl="0"/>
+            <a:r>
+              <a:rPr lang="ru-RU" sz="2400" dirty="0"/>
+              <a:t>Может создавать новых пациентов в системе;</a:t>
+            </a:r>
+          </a:p>
+          <a:p>
+            <a:pPr lvl="0"/>
+            <a:r>
+              <a:rPr lang="ru-RU" sz="2400" dirty="0"/>
+              <a:t>Может записывать пациентов на прием к врачам;</a:t>
+            </a:r>
+          </a:p>
+          <a:p>
+            <a:pPr lvl="0"/>
+            <a:r>
+              <a:rPr lang="ru-RU" sz="2400" dirty="0"/>
+              <a:t>Может просматривать и редактировать информацию о пациентах;</a:t>
+            </a:r>
+          </a:p>
+          <a:p>
+            <a:pPr lvl="0"/>
+            <a:r>
+              <a:rPr lang="ru-RU" sz="2400" dirty="0"/>
+              <a:t>Может проверять доступность и свободное время в расписании врачей;</a:t>
+            </a:r>
+          </a:p>
+          <a:p>
+            <a:pPr marL="0" indent="0">
+              <a:buFont typeface="Franklin Gothic Book" panose="020B0503020102020204" pitchFamily="34" charset="0"/>
+              <a:buNone/>
+            </a:pPr>
+            <a:endParaRPr lang="ru-RU" sz="2400" dirty="0"/>
+          </a:p>
+        </p:txBody>
+      </p:sp>
+      <p:sp>
+        <p:nvSpPr>
+          <p:cNvPr id="6" name="Номер слайда 5"/>
           <p:cNvSpPr>
             <a:spLocks noGrp="1"/>
           </p:cNvSpPr>
@@ -6504,7 +6786,7 @@
     </p:spTree>
     <p:extLst>
       <p:ext uri="{BB962C8B-B14F-4D97-AF65-F5344CB8AC3E}">
-        <p14:creationId xmlns:p14="http://schemas.microsoft.com/office/powerpoint/2010/main" val="2955419014"/>
+        <p14:creationId xmlns:p14="http://schemas.microsoft.com/office/powerpoint/2010/main" val="3623626667"/>
       </p:ext>
     </p:extLst>
   </p:cSld>
@@ -6536,7 +6818,7 @@
           <p:cNvPr id="2" name="Заголовок 1">
             <a:extLst>
               <a:ext uri="{FF2B5EF4-FFF2-40B4-BE49-F238E27FC236}">
-                <a16:creationId xmlns:a16="http://schemas.microsoft.com/office/drawing/2014/main" id="{C730E0CA-195E-6035-59DA-C5E99C8EF4C0}"/>
+                <a16:creationId xmlns:a16="http://schemas.microsoft.com/office/drawing/2014/main" id="{E8E0D8E1-BC96-F0D1-8711-F1A9313690DB}"/>
               </a:ext>
             </a:extLst>
           </p:cNvPr>
@@ -6549,8 +6831,8 @@
         </p:nvSpPr>
         <p:spPr>
           <a:xfrm>
-            <a:off x="1386840" y="116840"/>
-            <a:ext cx="9601200" cy="624840"/>
+            <a:off x="1371600" y="218440"/>
+            <a:ext cx="10820400" cy="665480"/>
           </a:xfrm>
         </p:spPr>
         <p:txBody>
@@ -6565,14 +6847,14 @@
                 <a:latin typeface="Times New Roman" pitchFamily="18" charset="0"/>
                 <a:cs typeface="Times New Roman" pitchFamily="18" charset="0"/>
               </a:rPr>
-              <a:t>Диаграмма классов уровня бизнес-логики</a:t>
+              <a:t>Общие принципы организации системы</a:t>
             </a:r>
           </a:p>
         </p:txBody>
       </p:sp>
       <p:pic>
         <p:nvPicPr>
-          <p:cNvPr id="3074" name="Picture 2" descr="C:\Users\vladb\Desktop\esap.png"/>
+          <p:cNvPr id="2050" name="Picture 2" descr="C:\Users\vladb\Desktop\6252ab051e670d13f9599d59_REST-API-Image_c0dd9870585de555571305f8b182d4828de0c889.png"/>
           <p:cNvPicPr>
             <a:picLocks noGrp="1" noChangeAspect="1" noChangeArrowheads="1"/>
           </p:cNvPicPr>
@@ -6581,7 +6863,7 @@
           </p:nvPr>
         </p:nvPicPr>
         <p:blipFill>
-          <a:blip r:embed="rId2" cstate="print">
+          <a:blip r:embed="rId2">
             <a:extLst>
               <a:ext uri="{28A0092B-C50C-407E-A947-70E740481C1C}">
                 <a14:useLocalDpi xmlns:a14="http://schemas.microsoft.com/office/drawing/2010/main" val="0"/>
@@ -6595,8 +6877,8 @@
         </p:blipFill>
         <p:spPr bwMode="auto">
           <a:xfrm>
-            <a:off x="2006490" y="792098"/>
-            <a:ext cx="8570070" cy="6065902"/>
+            <a:off x="2717800" y="1535053"/>
+            <a:ext cx="8127999" cy="4267199"/>
           </a:xfrm>
           <a:prstGeom prst="rect">
             <a:avLst/>
@@ -6615,7 +6897,7 @@
       </p:pic>
       <p:sp>
         <p:nvSpPr>
-          <p:cNvPr id="4" name="Номер слайда 3"/>
+          <p:cNvPr id="5" name="Номер слайда 4"/>
           <p:cNvSpPr>
             <a:spLocks noGrp="1"/>
           </p:cNvSpPr>
@@ -6639,7 +6921,7 @@
     </p:spTree>
     <p:extLst>
       <p:ext uri="{BB962C8B-B14F-4D97-AF65-F5344CB8AC3E}">
-        <p14:creationId xmlns:p14="http://schemas.microsoft.com/office/powerpoint/2010/main" val="700790611"/>
+        <p14:creationId xmlns:p14="http://schemas.microsoft.com/office/powerpoint/2010/main" val="333117324"/>
       </p:ext>
     </p:extLst>
   </p:cSld>
@@ -6671,7 +6953,7 @@
           <p:cNvPr id="2" name="Заголовок 1">
             <a:extLst>
               <a:ext uri="{FF2B5EF4-FFF2-40B4-BE49-F238E27FC236}">
-                <a16:creationId xmlns:a16="http://schemas.microsoft.com/office/drawing/2014/main" id="{4FB7650D-4B4D-C29E-5ECF-1801440813B3}"/>
+                <a16:creationId xmlns:a16="http://schemas.microsoft.com/office/drawing/2014/main" id="{F15CBDFC-06C4-0019-13CB-25CAB2B21ACC}"/>
               </a:ext>
             </a:extLst>
           </p:cNvPr>
@@ -6684,8 +6966,8 @@
         </p:nvSpPr>
         <p:spPr>
           <a:xfrm>
-            <a:off x="1315720" y="312420"/>
-            <a:ext cx="9601200" cy="916940"/>
+            <a:off x="2788920" y="0"/>
+            <a:ext cx="7787640" cy="599440"/>
           </a:xfrm>
         </p:spPr>
         <p:txBody>
@@ -6694,32 +6976,25 @@
           </a:bodyPr>
           <a:lstStyle/>
           <a:p>
-            <a:pPr algn="ctr"/>
             <a:r>
               <a:rPr lang="ru-RU" sz="4000" dirty="0"/>
-              <a:t>Сервис «</a:t>
-            </a:r>
-            <a:r>
-              <a:rPr lang="en-US" sz="4000" dirty="0"/>
-              <a:t>Schedule</a:t>
-            </a:r>
-            <a:r>
-              <a:rPr lang="ru-RU" sz="4000" dirty="0"/>
-              <a:t>»</a:t>
+              <a:t>Диаграмма классов-сущностей</a:t>
             </a:r>
           </a:p>
         </p:txBody>
       </p:sp>
       <p:pic>
         <p:nvPicPr>
-          <p:cNvPr id="4098" name="Picture 2"/>
+          <p:cNvPr id="1026" name="Picture 2"/>
           <p:cNvPicPr>
-            <a:picLocks noChangeAspect="1" noChangeArrowheads="1"/>
+            <a:picLocks noGrp="1" noChangeAspect="1" noChangeArrowheads="1"/>
           </p:cNvPicPr>
-          <p:nvPr/>
+          <p:nvPr>
+            <p:ph idx="1"/>
+          </p:nvPr>
         </p:nvPicPr>
         <p:blipFill>
-          <a:blip r:embed="rId2">
+          <a:blip r:embed="rId3" cstate="print">
             <a:extLst>
               <a:ext uri="{28A0092B-C50C-407E-A947-70E740481C1C}">
                 <a14:useLocalDpi xmlns:a14="http://schemas.microsoft.com/office/drawing/2010/main" val="0"/>
@@ -6733,8 +7008,8 @@
         </p:blipFill>
         <p:spPr bwMode="auto">
           <a:xfrm>
-            <a:off x="849313" y="1885950"/>
-            <a:ext cx="11215064" cy="3732530"/>
+            <a:off x="2836636" y="637326"/>
+            <a:ext cx="6835684" cy="6232632"/>
           </a:xfrm>
           <a:prstGeom prst="rect">
             <a:avLst/>
@@ -6800,7 +7075,7 @@
     </p:spTree>
     <p:extLst>
       <p:ext uri="{BB962C8B-B14F-4D97-AF65-F5344CB8AC3E}">
-        <p14:creationId xmlns:p14="http://schemas.microsoft.com/office/powerpoint/2010/main" val="773061562"/>
+        <p14:creationId xmlns:p14="http://schemas.microsoft.com/office/powerpoint/2010/main" val="2955419014"/>
       </p:ext>
     </p:extLst>
   </p:cSld>
@@ -6832,7 +7107,7 @@
           <p:cNvPr id="2" name="Заголовок 1">
             <a:extLst>
               <a:ext uri="{FF2B5EF4-FFF2-40B4-BE49-F238E27FC236}">
-                <a16:creationId xmlns:a16="http://schemas.microsoft.com/office/drawing/2014/main" id="{4FB7650D-4B4D-C29E-5ECF-1801440813B3}"/>
+                <a16:creationId xmlns:a16="http://schemas.microsoft.com/office/drawing/2014/main" id="{C730E0CA-195E-6035-59DA-C5E99C8EF4C0}"/>
               </a:ext>
             </a:extLst>
           </p:cNvPr>
@@ -6845,8 +7120,8 @@
         </p:nvSpPr>
         <p:spPr>
           <a:xfrm>
-            <a:off x="1295400" y="149860"/>
-            <a:ext cx="9601200" cy="916940"/>
+            <a:off x="1386840" y="116840"/>
+            <a:ext cx="9601200" cy="624840"/>
           </a:xfrm>
         </p:spPr>
         <p:txBody>
@@ -6857,30 +7132,27 @@
           <a:p>
             <a:pPr algn="ctr"/>
             <a:r>
-              <a:rPr lang="ru-RU" sz="3200" dirty="0"/>
-              <a:t>Сервис «</a:t>
-            </a:r>
-            <a:r>
-              <a:rPr lang="en-US" sz="3200" dirty="0" err="1"/>
-              <a:t>MedicalCard</a:t>
-            </a:r>
-            <a:r>
-              <a:rPr lang="ru-RU" sz="3200" dirty="0"/>
-              <a:t>»</a:t>
+              <a:rPr lang="ru-RU" sz="4000" dirty="0">
+                <a:latin typeface="Times New Roman" pitchFamily="18" charset="0"/>
+                <a:cs typeface="Times New Roman" pitchFamily="18" charset="0"/>
+              </a:rPr>
+              <a:t>Диаграмма классов уровня бизнес-логики</a:t>
             </a:r>
           </a:p>
         </p:txBody>
       </p:sp>
       <p:pic>
         <p:nvPicPr>
-          <p:cNvPr id="5122" name="Picture 2"/>
+          <p:cNvPr id="3074" name="Picture 2" descr="C:\Users\vladb\Desktop\esap.png"/>
           <p:cNvPicPr>
-            <a:picLocks noChangeAspect="1" noChangeArrowheads="1"/>
+            <a:picLocks noGrp="1" noChangeAspect="1" noChangeArrowheads="1"/>
           </p:cNvPicPr>
-          <p:nvPr/>
+          <p:nvPr>
+            <p:ph idx="1"/>
+          </p:nvPr>
         </p:nvPicPr>
         <p:blipFill>
-          <a:blip r:embed="rId2">
+          <a:blip r:embed="rId2" cstate="print">
             <a:extLst>
               <a:ext uri="{28A0092B-C50C-407E-A947-70E740481C1C}">
                 <a14:useLocalDpi xmlns:a14="http://schemas.microsoft.com/office/drawing/2010/main" val="0"/>
@@ -6894,43 +7166,20 @@
         </p:blipFill>
         <p:spPr bwMode="auto">
           <a:xfrm>
-            <a:off x="760700" y="2565400"/>
-            <a:ext cx="11431300" cy="2230120"/>
+            <a:off x="2006490" y="792098"/>
+            <a:ext cx="8570070" cy="6065902"/>
           </a:xfrm>
           <a:prstGeom prst="rect">
             <a:avLst/>
           </a:prstGeom>
           <a:noFill/>
-          <a:ln>
-            <a:noFill/>
-          </a:ln>
-          <a:effectLst/>
           <a:extLst>
             <a:ext uri="{909E8E84-426E-40DD-AFC4-6F175D3DCCD1}">
               <a14:hiddenFill xmlns:a14="http://schemas.microsoft.com/office/drawing/2010/main">
                 <a:solidFill>
-                  <a:schemeClr val="accent1"/>
+                  <a:srgbClr val="FFFFFF"/>
                 </a:solidFill>
               </a14:hiddenFill>
-            </a:ext>
-            <a:ext uri="{91240B29-F687-4F45-9708-019B960494DF}">
-              <a14:hiddenLine xmlns:a14="http://schemas.microsoft.com/office/drawing/2010/main" w="9525">
-                <a:solidFill>
-                  <a:schemeClr val="tx1"/>
-                </a:solidFill>
-                <a:miter lim="800000"/>
-                <a:headEnd/>
-                <a:tailEnd/>
-              </a14:hiddenLine>
-            </a:ext>
-            <a:ext uri="{AF507438-7753-43E0-B8FC-AC1667EBCBE1}">
-              <a14:hiddenEffects xmlns:a14="http://schemas.microsoft.com/office/drawing/2010/main">
-                <a:effectLst>
-                  <a:outerShdw dist="35921" dir="2700000" algn="ctr" rotWithShape="0">
-                    <a:schemeClr val="bg2"/>
-                  </a:outerShdw>
-                </a:effectLst>
-              </a14:hiddenEffects>
             </a:ext>
           </a:extLst>
         </p:spPr>
@@ -6961,7 +7210,7 @@
     </p:spTree>
     <p:extLst>
       <p:ext uri="{BB962C8B-B14F-4D97-AF65-F5344CB8AC3E}">
-        <p14:creationId xmlns:p14="http://schemas.microsoft.com/office/powerpoint/2010/main" val="967620519"/>
+        <p14:creationId xmlns:p14="http://schemas.microsoft.com/office/powerpoint/2010/main" val="700790611"/>
       </p:ext>
     </p:extLst>
   </p:cSld>
@@ -7006,8 +7255,8 @@
         </p:nvSpPr>
         <p:spPr>
           <a:xfrm>
-            <a:off x="1352939" y="161679"/>
-            <a:ext cx="10150151" cy="916940"/>
+            <a:off x="1315720" y="312420"/>
+            <a:ext cx="9601200" cy="916940"/>
           </a:xfrm>
         </p:spPr>
         <p:txBody>
@@ -7018,25 +7267,23 @@
           <a:p>
             <a:pPr algn="ctr"/>
             <a:r>
-              <a:rPr lang="en-US" sz="4000" dirty="0">
-                <a:latin typeface="Times New Roman" pitchFamily="18" charset="0"/>
-                <a:cs typeface="Times New Roman" pitchFamily="18" charset="0"/>
-              </a:rPr>
-              <a:t>HQL </a:t>
-            </a:r>
-            <a:r>
-              <a:rPr lang="ru-RU" sz="4000" dirty="0">
-                <a:latin typeface="Times New Roman" pitchFamily="18" charset="0"/>
-                <a:cs typeface="Times New Roman" pitchFamily="18" charset="0"/>
-              </a:rPr>
-              <a:t>Запрос для получения медицинской карты по фильтру</a:t>
+              <a:rPr lang="ru-RU" sz="4000" dirty="0"/>
+              <a:t>Сервис «</a:t>
+            </a:r>
+            <a:r>
+              <a:rPr lang="en-US" sz="4000" dirty="0"/>
+              <a:t>Schedule</a:t>
+            </a:r>
+            <a:r>
+              <a:rPr lang="ru-RU" sz="4000" dirty="0"/>
+              <a:t>»</a:t>
             </a:r>
           </a:p>
         </p:txBody>
       </p:sp>
       <p:pic>
         <p:nvPicPr>
-          <p:cNvPr id="6146" name="Picture 2"/>
+          <p:cNvPr id="4098" name="Picture 2"/>
           <p:cNvPicPr>
             <a:picLocks noChangeAspect="1" noChangeArrowheads="1"/>
           </p:cNvPicPr>
@@ -7057,8 +7304,8 @@
         </p:blipFill>
         <p:spPr bwMode="auto">
           <a:xfrm>
-            <a:off x="844549" y="2792730"/>
-            <a:ext cx="11303639" cy="1931670"/>
+            <a:off x="849313" y="1885950"/>
+            <a:ext cx="11215064" cy="3732530"/>
           </a:xfrm>
           <a:prstGeom prst="rect">
             <a:avLst/>
@@ -7124,7 +7371,7 @@
     </p:spTree>
     <p:extLst>
       <p:ext uri="{BB962C8B-B14F-4D97-AF65-F5344CB8AC3E}">
-        <p14:creationId xmlns:p14="http://schemas.microsoft.com/office/powerpoint/2010/main" val="619977534"/>
+        <p14:creationId xmlns:p14="http://schemas.microsoft.com/office/powerpoint/2010/main" val="773061562"/>
       </p:ext>
     </p:extLst>
   </p:cSld>
@@ -7169,8 +7416,8 @@
         </p:nvSpPr>
         <p:spPr>
           <a:xfrm>
-            <a:off x="1286070" y="152349"/>
-            <a:ext cx="9919996" cy="916940"/>
+            <a:off x="1295400" y="149860"/>
+            <a:ext cx="9601200" cy="916940"/>
           </a:xfrm>
         </p:spPr>
         <p:txBody>
@@ -7181,39 +7428,82 @@
           <a:p>
             <a:pPr algn="ctr"/>
             <a:r>
-              <a:rPr lang="ru-RU" sz="4000" dirty="0">
-                <a:latin typeface="Times New Roman" pitchFamily="18" charset="0"/>
-                <a:cs typeface="Times New Roman" pitchFamily="18" charset="0"/>
-              </a:rPr>
-              <a:t>Тест план</a:t>
+              <a:rPr lang="ru-RU" sz="3200" dirty="0"/>
+              <a:t>Сервис «</a:t>
+            </a:r>
+            <a:r>
+              <a:rPr lang="en-US" sz="3200" dirty="0" err="1"/>
+              <a:t>MedicalCard</a:t>
+            </a:r>
+            <a:r>
+              <a:rPr lang="ru-RU" sz="3200" dirty="0"/>
+              <a:t>»</a:t>
             </a:r>
           </a:p>
         </p:txBody>
       </p:sp>
       <p:pic>
         <p:nvPicPr>
-          <p:cNvPr id="5" name="Объект 4"/>
+          <p:cNvPr id="5122" name="Picture 2"/>
           <p:cNvPicPr>
-            <a:picLocks noGrp="1"/>
+            <a:picLocks noChangeAspect="1" noChangeArrowheads="1"/>
           </p:cNvPicPr>
-          <p:nvPr>
-            <p:ph idx="1"/>
-          </p:nvPr>
+          <p:nvPr/>
         </p:nvPicPr>
         <p:blipFill>
-          <a:blip r:embed="rId2"/>
+          <a:blip r:embed="rId2">
+            <a:extLst>
+              <a:ext uri="{28A0092B-C50C-407E-A947-70E740481C1C}">
+                <a14:useLocalDpi xmlns:a14="http://schemas.microsoft.com/office/drawing/2010/main" val="0"/>
+              </a:ext>
+            </a:extLst>
+          </a:blip>
+          <a:srcRect/>
           <a:stretch>
             <a:fillRect/>
           </a:stretch>
         </p:blipFill>
-        <p:spPr>
-          <a:xfrm>
-            <a:off x="3894076" y="975360"/>
-            <a:ext cx="4172964" cy="5730291"/>
+        <p:spPr bwMode="auto">
+          <a:xfrm>
+            <a:off x="760700" y="2565400"/>
+            <a:ext cx="11431300" cy="2230120"/>
           </a:xfrm>
           <a:prstGeom prst="rect">
             <a:avLst/>
           </a:prstGeom>
+          <a:noFill/>
+          <a:ln>
+            <a:noFill/>
+          </a:ln>
+          <a:effectLst/>
+          <a:extLst>
+            <a:ext uri="{909E8E84-426E-40DD-AFC4-6F175D3DCCD1}">
+              <a14:hiddenFill xmlns:a14="http://schemas.microsoft.com/office/drawing/2010/main">
+                <a:solidFill>
+                  <a:schemeClr val="accent1"/>
+                </a:solidFill>
+              </a14:hiddenFill>
+            </a:ext>
+            <a:ext uri="{91240B29-F687-4F45-9708-019B960494DF}">
+              <a14:hiddenLine xmlns:a14="http://schemas.microsoft.com/office/drawing/2010/main" w="9525">
+                <a:solidFill>
+                  <a:schemeClr val="tx1"/>
+                </a:solidFill>
+                <a:miter lim="800000"/>
+                <a:headEnd/>
+                <a:tailEnd/>
+              </a14:hiddenLine>
+            </a:ext>
+            <a:ext uri="{AF507438-7753-43E0-B8FC-AC1667EBCBE1}">
+              <a14:hiddenEffects xmlns:a14="http://schemas.microsoft.com/office/drawing/2010/main">
+                <a:effectLst>
+                  <a:outerShdw dist="35921" dir="2700000" algn="ctr" rotWithShape="0">
+                    <a:schemeClr val="bg2"/>
+                  </a:outerShdw>
+                </a:effectLst>
+              </a14:hiddenEffects>
+            </a:ext>
+          </a:extLst>
         </p:spPr>
       </p:pic>
       <p:sp>
@@ -7242,7 +7532,7 @@
     </p:spTree>
     <p:extLst>
       <p:ext uri="{BB962C8B-B14F-4D97-AF65-F5344CB8AC3E}">
-        <p14:creationId xmlns:p14="http://schemas.microsoft.com/office/powerpoint/2010/main" val="3854768536"/>
+        <p14:creationId xmlns:p14="http://schemas.microsoft.com/office/powerpoint/2010/main" val="967620519"/>
       </p:ext>
     </p:extLst>
   </p:cSld>

</xml_diff>